<commit_message>
update promo source with icon export instructions
</commit_message>
<xml_diff>
--- a/dist-env/src/cws/app-promo/promo.pptx
+++ b/dist-env/src/cws/app-promo/promo.pptx
@@ -2418,9 +2418,14 @@
 <p:sldMaster xmlns:a="http://schemas.openxmlformats.org/drawingml/2006/main" xmlns:r="http://schemas.openxmlformats.org/officeDocument/2006/relationships" xmlns:p="http://schemas.openxmlformats.org/presentationml/2006/main">
   <p:cSld>
     <p:bg>
-      <p:bgRef idx="1001">
-        <a:schemeClr val="bg1"/>
-      </p:bgRef>
+      <p:bgPr>
+        <a:solidFill>
+          <a:schemeClr val="bg1">
+            <a:alpha val="0"/>
+          </a:schemeClr>
+        </a:solidFill>
+        <a:effectLst/>
+      </p:bgPr>
     </p:bg>
     <p:spTree>
       <p:nvGrpSpPr>
@@ -3194,6 +3199,13 @@
   <p:clrMapOvr>
     <a:masterClrMapping/>
   </p:clrMapOvr>
+  <p:timing>
+    <p:tnLst>
+      <p:par>
+        <p:cTn id="1" dur="indefinite" restart="never" nodeType="tmRoot"/>
+      </p:par>
+    </p:tnLst>
+  </p:timing>
 </p:sld>
 </file>
 
@@ -3655,6 +3667,13 @@
   <p:clrMapOvr>
     <a:masterClrMapping/>
   </p:clrMapOvr>
+  <p:timing>
+    <p:tnLst>
+      <p:par>
+        <p:cTn id="1" dur="indefinite" restart="never" nodeType="tmRoot"/>
+      </p:par>
+    </p:tnLst>
+  </p:timing>
 </p:sld>
 </file>
 
@@ -3741,11 +3760,52 @@
           </a:fontRef>
         </p:style>
         <p:txBody>
-          <a:bodyPr rtlCol="0" anchor="ctr"/>
-          <a:lstStyle/>
-          <a:p>
-            <a:pPr algn="ctr"/>
-            <a:endParaRPr lang="en-GB"/>
+          <a:bodyPr rtlCol="0" anchor="t"/>
+          <a:lstStyle/>
+          <a:p>
+            <a:r>
+              <a:rPr lang="en-US" dirty="0" smtClean="0">
+                <a:solidFill>
+                  <a:srgbClr val="002060"/>
+                </a:solidFill>
+              </a:rPr>
+              <a:t>Select elements of icon</a:t>
+            </a:r>
+          </a:p>
+          <a:p>
+            <a:r>
+              <a:rPr lang="en-US" dirty="0" smtClean="0">
+                <a:solidFill>
+                  <a:srgbClr val="002060"/>
+                </a:solidFill>
+              </a:rPr>
+              <a:t>Right-click</a:t>
+            </a:r>
+          </a:p>
+          <a:p>
+            <a:r>
+              <a:rPr lang="en-US" dirty="0" smtClean="0">
+                <a:solidFill>
+                  <a:srgbClr val="002060"/>
+                </a:solidFill>
+              </a:rPr>
+              <a:t>Save as picture</a:t>
+            </a:r>
+          </a:p>
+          <a:p>
+            <a:r>
+              <a:rPr lang="en-US" dirty="0" smtClean="0">
+                <a:solidFill>
+                  <a:srgbClr val="002060"/>
+                </a:solidFill>
+              </a:rPr>
+              <a:t>Check dimensions/aspect ratio</a:t>
+            </a:r>
+            <a:endParaRPr lang="en-GB" dirty="0">
+              <a:solidFill>
+                <a:srgbClr val="002060"/>
+              </a:solidFill>
+            </a:endParaRPr>
           </a:p>
         </p:txBody>
       </p:sp>
@@ -3758,7 +3818,7 @@
         <p:spPr>
           <a:xfrm>
             <a:off x="2856000" y="317040"/>
-            <a:ext cx="6480000" cy="6480000"/>
+            <a:ext cx="6480000" cy="6474285"/>
           </a:xfrm>
           <a:prstGeom prst="ellipse">
             <a:avLst/>
@@ -4096,6 +4156,13 @@
   <p:clrMapOvr>
     <a:masterClrMapping/>
   </p:clrMapOvr>
+  <p:timing>
+    <p:tnLst>
+      <p:par>
+        <p:cTn id="1" dur="indefinite" restart="never" nodeType="tmRoot"/>
+      </p:par>
+    </p:tnLst>
+  </p:timing>
 </p:sld>
 </file>
 

</xml_diff>

<commit_message>
improve ico elements ratio
</commit_message>
<xml_diff>
--- a/dist-env/src/cws/app-promo/promo.pptx
+++ b/dist-env/src/cws/app-promo/promo.pptx
@@ -3860,8 +3860,8 @@
         </p:nvGrpSpPr>
         <p:grpSpPr>
           <a:xfrm rot="2550680">
-            <a:off x="5240105" y="793065"/>
-            <a:ext cx="1711788" cy="5527948"/>
+            <a:off x="5333380" y="1091422"/>
+            <a:ext cx="1525240" cy="4925520"/>
             <a:chOff x="617202" y="984739"/>
             <a:chExt cx="1055078" cy="3407207"/>
           </a:xfrm>

</xml_diff>

<commit_message>
add asset for facebook
</commit_message>
<xml_diff>
--- a/dist-env/src/cws/app-promo/promo.pptx
+++ b/dist-env/src/cws/app-promo/promo.pptx
@@ -4,10 +4,14 @@
   <p:sldMasterIdLst>
     <p:sldMasterId id="2147483648" r:id="rId1"/>
   </p:sldMasterIdLst>
+  <p:notesMasterIdLst>
+    <p:notesMasterId r:id="rId6"/>
+  </p:notesMasterIdLst>
   <p:sldIdLst>
     <p:sldId id="256" r:id="rId2"/>
-    <p:sldId id="257" r:id="rId3"/>
-    <p:sldId id="258" r:id="rId4"/>
+    <p:sldId id="259" r:id="rId3"/>
+    <p:sldId id="257" r:id="rId4"/>
+    <p:sldId id="258" r:id="rId5"/>
   </p:sldIdLst>
   <p:sldSz cx="12192000" cy="6858000"/>
   <p:notesSz cx="6858000" cy="9144000"/>
@@ -114,6 +118,444 @@
 </p:presentation>
 </file>
 
+<file path=ppt/notesMasters/notesMaster1.xml><?xml version="1.0" encoding="utf-8"?>
+<p:notesMaster xmlns:a="http://schemas.openxmlformats.org/drawingml/2006/main" xmlns:r="http://schemas.openxmlformats.org/officeDocument/2006/relationships" xmlns:p="http://schemas.openxmlformats.org/presentationml/2006/main">
+  <p:cSld>
+    <p:bg>
+      <p:bgRef idx="1001">
+        <a:schemeClr val="bg1"/>
+      </p:bgRef>
+    </p:bg>
+    <p:spTree>
+      <p:nvGrpSpPr>
+        <p:cNvPr id="1" name=""/>
+        <p:cNvGrpSpPr/>
+        <p:nvPr/>
+      </p:nvGrpSpPr>
+      <p:grpSpPr>
+        <a:xfrm>
+          <a:off x="0" y="0"/>
+          <a:ext cx="0" cy="0"/>
+          <a:chOff x="0" y="0"/>
+          <a:chExt cx="0" cy="0"/>
+        </a:xfrm>
+      </p:grpSpPr>
+      <p:sp>
+        <p:nvSpPr>
+          <p:cNvPr id="2" name="Header Placeholder 1"/>
+          <p:cNvSpPr>
+            <a:spLocks noGrp="1"/>
+          </p:cNvSpPr>
+          <p:nvPr>
+            <p:ph type="hdr" sz="quarter"/>
+          </p:nvPr>
+        </p:nvSpPr>
+        <p:spPr>
+          <a:xfrm>
+            <a:off x="0" y="0"/>
+            <a:ext cx="2971800" cy="458788"/>
+          </a:xfrm>
+          <a:prstGeom prst="rect">
+            <a:avLst/>
+          </a:prstGeom>
+        </p:spPr>
+        <p:txBody>
+          <a:bodyPr vert="horz" lIns="91440" tIns="45720" rIns="91440" bIns="45720" rtlCol="0"/>
+          <a:lstStyle>
+            <a:lvl1pPr algn="l">
+              <a:defRPr sz="1200"/>
+            </a:lvl1pPr>
+          </a:lstStyle>
+          <a:p>
+            <a:endParaRPr lang="en-GB"/>
+          </a:p>
+        </p:txBody>
+      </p:sp>
+      <p:sp>
+        <p:nvSpPr>
+          <p:cNvPr id="3" name="Date Placeholder 2"/>
+          <p:cNvSpPr>
+            <a:spLocks noGrp="1"/>
+          </p:cNvSpPr>
+          <p:nvPr>
+            <p:ph type="dt" idx="1"/>
+          </p:nvPr>
+        </p:nvSpPr>
+        <p:spPr>
+          <a:xfrm>
+            <a:off x="3884613" y="0"/>
+            <a:ext cx="2971800" cy="458788"/>
+          </a:xfrm>
+          <a:prstGeom prst="rect">
+            <a:avLst/>
+          </a:prstGeom>
+        </p:spPr>
+        <p:txBody>
+          <a:bodyPr vert="horz" lIns="91440" tIns="45720" rIns="91440" bIns="45720" rtlCol="0"/>
+          <a:lstStyle>
+            <a:lvl1pPr algn="r">
+              <a:defRPr sz="1200"/>
+            </a:lvl1pPr>
+          </a:lstStyle>
+          <a:p>
+            <a:fld id="{DA1CD8E3-66EA-4860-B6DD-845275B8FDA1}" type="datetimeFigureOut">
+              <a:rPr lang="en-GB" smtClean="0"/>
+              <a:t>09/09/2017</a:t>
+            </a:fld>
+            <a:endParaRPr lang="en-GB"/>
+          </a:p>
+        </p:txBody>
+      </p:sp>
+      <p:sp>
+        <p:nvSpPr>
+          <p:cNvPr id="4" name="Slide Image Placeholder 3"/>
+          <p:cNvSpPr>
+            <a:spLocks noGrp="1" noRot="1" noChangeAspect="1"/>
+          </p:cNvSpPr>
+          <p:nvPr>
+            <p:ph type="sldImg" idx="2"/>
+          </p:nvPr>
+        </p:nvSpPr>
+        <p:spPr>
+          <a:xfrm>
+            <a:off x="685800" y="1143000"/>
+            <a:ext cx="5486400" cy="3086100"/>
+          </a:xfrm>
+          <a:prstGeom prst="rect">
+            <a:avLst/>
+          </a:prstGeom>
+          <a:noFill/>
+          <a:ln w="12700">
+            <a:solidFill>
+              <a:prstClr val="black"/>
+            </a:solidFill>
+          </a:ln>
+        </p:spPr>
+        <p:txBody>
+          <a:bodyPr vert="horz" lIns="91440" tIns="45720" rIns="91440" bIns="45720" rtlCol="0" anchor="ctr"/>
+          <a:lstStyle/>
+          <a:p>
+            <a:endParaRPr lang="en-GB"/>
+          </a:p>
+        </p:txBody>
+      </p:sp>
+      <p:sp>
+        <p:nvSpPr>
+          <p:cNvPr id="5" name="Notes Placeholder 4"/>
+          <p:cNvSpPr>
+            <a:spLocks noGrp="1"/>
+          </p:cNvSpPr>
+          <p:nvPr>
+            <p:ph type="body" sz="quarter" idx="3"/>
+          </p:nvPr>
+        </p:nvSpPr>
+        <p:spPr>
+          <a:xfrm>
+            <a:off x="685800" y="4400550"/>
+            <a:ext cx="5486400" cy="3600450"/>
+          </a:xfrm>
+          <a:prstGeom prst="rect">
+            <a:avLst/>
+          </a:prstGeom>
+        </p:spPr>
+        <p:txBody>
+          <a:bodyPr vert="horz" lIns="91440" tIns="45720" rIns="91440" bIns="45720" rtlCol="0"/>
+          <a:lstStyle/>
+          <a:p>
+            <a:pPr lvl="0"/>
+            <a:r>
+              <a:rPr lang="en-US" smtClean="0"/>
+              <a:t>Click to edit Master text styles</a:t>
+            </a:r>
+          </a:p>
+          <a:p>
+            <a:pPr lvl="1"/>
+            <a:r>
+              <a:rPr lang="en-US" smtClean="0"/>
+              <a:t>Second level</a:t>
+            </a:r>
+          </a:p>
+          <a:p>
+            <a:pPr lvl="2"/>
+            <a:r>
+              <a:rPr lang="en-US" smtClean="0"/>
+              <a:t>Third level</a:t>
+            </a:r>
+          </a:p>
+          <a:p>
+            <a:pPr lvl="3"/>
+            <a:r>
+              <a:rPr lang="en-US" smtClean="0"/>
+              <a:t>Fourth level</a:t>
+            </a:r>
+          </a:p>
+          <a:p>
+            <a:pPr lvl="4"/>
+            <a:r>
+              <a:rPr lang="en-US" smtClean="0"/>
+              <a:t>Fifth level</a:t>
+            </a:r>
+            <a:endParaRPr lang="en-GB"/>
+          </a:p>
+        </p:txBody>
+      </p:sp>
+      <p:sp>
+        <p:nvSpPr>
+          <p:cNvPr id="6" name="Footer Placeholder 5"/>
+          <p:cNvSpPr>
+            <a:spLocks noGrp="1"/>
+          </p:cNvSpPr>
+          <p:nvPr>
+            <p:ph type="ftr" sz="quarter" idx="4"/>
+          </p:nvPr>
+        </p:nvSpPr>
+        <p:spPr>
+          <a:xfrm>
+            <a:off x="0" y="8685213"/>
+            <a:ext cx="2971800" cy="458787"/>
+          </a:xfrm>
+          <a:prstGeom prst="rect">
+            <a:avLst/>
+          </a:prstGeom>
+        </p:spPr>
+        <p:txBody>
+          <a:bodyPr vert="horz" lIns="91440" tIns="45720" rIns="91440" bIns="45720" rtlCol="0" anchor="b"/>
+          <a:lstStyle>
+            <a:lvl1pPr algn="l">
+              <a:defRPr sz="1200"/>
+            </a:lvl1pPr>
+          </a:lstStyle>
+          <a:p>
+            <a:endParaRPr lang="en-GB"/>
+          </a:p>
+        </p:txBody>
+      </p:sp>
+      <p:sp>
+        <p:nvSpPr>
+          <p:cNvPr id="7" name="Slide Number Placeholder 6"/>
+          <p:cNvSpPr>
+            <a:spLocks noGrp="1"/>
+          </p:cNvSpPr>
+          <p:nvPr>
+            <p:ph type="sldNum" sz="quarter" idx="5"/>
+          </p:nvPr>
+        </p:nvSpPr>
+        <p:spPr>
+          <a:xfrm>
+            <a:off x="3884613" y="8685213"/>
+            <a:ext cx="2971800" cy="458787"/>
+          </a:xfrm>
+          <a:prstGeom prst="rect">
+            <a:avLst/>
+          </a:prstGeom>
+        </p:spPr>
+        <p:txBody>
+          <a:bodyPr vert="horz" lIns="91440" tIns="45720" rIns="91440" bIns="45720" rtlCol="0" anchor="b"/>
+          <a:lstStyle>
+            <a:lvl1pPr algn="r">
+              <a:defRPr sz="1200"/>
+            </a:lvl1pPr>
+          </a:lstStyle>
+          <a:p>
+            <a:fld id="{427AF63E-676C-490F-B031-3BAEFE8BE401}" type="slidenum">
+              <a:rPr lang="en-GB" smtClean="0"/>
+              <a:t>‹#›</a:t>
+            </a:fld>
+            <a:endParaRPr lang="en-GB"/>
+          </a:p>
+        </p:txBody>
+      </p:sp>
+    </p:spTree>
+    <p:extLst>
+      <p:ext uri="{BB962C8B-B14F-4D97-AF65-F5344CB8AC3E}">
+        <p14:creationId xmlns:p14="http://schemas.microsoft.com/office/powerpoint/2010/main" val="1449889945"/>
+      </p:ext>
+    </p:extLst>
+  </p:cSld>
+  <p:clrMap bg1="lt1" tx1="dk1" bg2="lt2" tx2="dk2" accent1="accent1" accent2="accent2" accent3="accent3" accent4="accent4" accent5="accent5" accent6="accent6" hlink="hlink" folHlink="folHlink"/>
+  <p:notesStyle>
+    <a:lvl1pPr marL="0" algn="l" defTabSz="914400" rtl="0" eaLnBrk="1" latinLnBrk="0" hangingPunct="1">
+      <a:defRPr sz="1200" kern="1200">
+        <a:solidFill>
+          <a:schemeClr val="tx1"/>
+        </a:solidFill>
+        <a:latin typeface="+mn-lt"/>
+        <a:ea typeface="+mn-ea"/>
+        <a:cs typeface="+mn-cs"/>
+      </a:defRPr>
+    </a:lvl1pPr>
+    <a:lvl2pPr marL="457200" algn="l" defTabSz="914400" rtl="0" eaLnBrk="1" latinLnBrk="0" hangingPunct="1">
+      <a:defRPr sz="1200" kern="1200">
+        <a:solidFill>
+          <a:schemeClr val="tx1"/>
+        </a:solidFill>
+        <a:latin typeface="+mn-lt"/>
+        <a:ea typeface="+mn-ea"/>
+        <a:cs typeface="+mn-cs"/>
+      </a:defRPr>
+    </a:lvl2pPr>
+    <a:lvl3pPr marL="914400" algn="l" defTabSz="914400" rtl="0" eaLnBrk="1" latinLnBrk="0" hangingPunct="1">
+      <a:defRPr sz="1200" kern="1200">
+        <a:solidFill>
+          <a:schemeClr val="tx1"/>
+        </a:solidFill>
+        <a:latin typeface="+mn-lt"/>
+        <a:ea typeface="+mn-ea"/>
+        <a:cs typeface="+mn-cs"/>
+      </a:defRPr>
+    </a:lvl3pPr>
+    <a:lvl4pPr marL="1371600" algn="l" defTabSz="914400" rtl="0" eaLnBrk="1" latinLnBrk="0" hangingPunct="1">
+      <a:defRPr sz="1200" kern="1200">
+        <a:solidFill>
+          <a:schemeClr val="tx1"/>
+        </a:solidFill>
+        <a:latin typeface="+mn-lt"/>
+        <a:ea typeface="+mn-ea"/>
+        <a:cs typeface="+mn-cs"/>
+      </a:defRPr>
+    </a:lvl4pPr>
+    <a:lvl5pPr marL="1828800" algn="l" defTabSz="914400" rtl="0" eaLnBrk="1" latinLnBrk="0" hangingPunct="1">
+      <a:defRPr sz="1200" kern="1200">
+        <a:solidFill>
+          <a:schemeClr val="tx1"/>
+        </a:solidFill>
+        <a:latin typeface="+mn-lt"/>
+        <a:ea typeface="+mn-ea"/>
+        <a:cs typeface="+mn-cs"/>
+      </a:defRPr>
+    </a:lvl5pPr>
+    <a:lvl6pPr marL="2286000" algn="l" defTabSz="914400" rtl="0" eaLnBrk="1" latinLnBrk="0" hangingPunct="1">
+      <a:defRPr sz="1200" kern="1200">
+        <a:solidFill>
+          <a:schemeClr val="tx1"/>
+        </a:solidFill>
+        <a:latin typeface="+mn-lt"/>
+        <a:ea typeface="+mn-ea"/>
+        <a:cs typeface="+mn-cs"/>
+      </a:defRPr>
+    </a:lvl6pPr>
+    <a:lvl7pPr marL="2743200" algn="l" defTabSz="914400" rtl="0" eaLnBrk="1" latinLnBrk="0" hangingPunct="1">
+      <a:defRPr sz="1200" kern="1200">
+        <a:solidFill>
+          <a:schemeClr val="tx1"/>
+        </a:solidFill>
+        <a:latin typeface="+mn-lt"/>
+        <a:ea typeface="+mn-ea"/>
+        <a:cs typeface="+mn-cs"/>
+      </a:defRPr>
+    </a:lvl7pPr>
+    <a:lvl8pPr marL="3200400" algn="l" defTabSz="914400" rtl="0" eaLnBrk="1" latinLnBrk="0" hangingPunct="1">
+      <a:defRPr sz="1200" kern="1200">
+        <a:solidFill>
+          <a:schemeClr val="tx1"/>
+        </a:solidFill>
+        <a:latin typeface="+mn-lt"/>
+        <a:ea typeface="+mn-ea"/>
+        <a:cs typeface="+mn-cs"/>
+      </a:defRPr>
+    </a:lvl8pPr>
+    <a:lvl9pPr marL="3657600" algn="l" defTabSz="914400" rtl="0" eaLnBrk="1" latinLnBrk="0" hangingPunct="1">
+      <a:defRPr sz="1200" kern="1200">
+        <a:solidFill>
+          <a:schemeClr val="tx1"/>
+        </a:solidFill>
+        <a:latin typeface="+mn-lt"/>
+        <a:ea typeface="+mn-ea"/>
+        <a:cs typeface="+mn-cs"/>
+      </a:defRPr>
+    </a:lvl9pPr>
+  </p:notesStyle>
+</p:notesMaster>
+</file>
+
+<file path=ppt/notesSlides/notesSlide1.xml><?xml version="1.0" encoding="utf-8"?>
+<p:notes xmlns:a="http://schemas.openxmlformats.org/drawingml/2006/main" xmlns:r="http://schemas.openxmlformats.org/officeDocument/2006/relationships" xmlns:p="http://schemas.openxmlformats.org/presentationml/2006/main">
+  <p:cSld>
+    <p:spTree>
+      <p:nvGrpSpPr>
+        <p:cNvPr id="1" name=""/>
+        <p:cNvGrpSpPr/>
+        <p:nvPr/>
+      </p:nvGrpSpPr>
+      <p:grpSpPr>
+        <a:xfrm>
+          <a:off x="0" y="0"/>
+          <a:ext cx="0" cy="0"/>
+          <a:chOff x="0" y="0"/>
+          <a:chExt cx="0" cy="0"/>
+        </a:xfrm>
+      </p:grpSpPr>
+      <p:sp>
+        <p:nvSpPr>
+          <p:cNvPr id="2" name="Slide Image Placeholder 1"/>
+          <p:cNvSpPr>
+            <a:spLocks noGrp="1" noRot="1" noChangeAspect="1"/>
+          </p:cNvSpPr>
+          <p:nvPr>
+            <p:ph type="sldImg"/>
+          </p:nvPr>
+        </p:nvSpPr>
+        <p:spPr/>
+      </p:sp>
+      <p:sp>
+        <p:nvSpPr>
+          <p:cNvPr id="3" name="Notes Placeholder 2"/>
+          <p:cNvSpPr>
+            <a:spLocks noGrp="1"/>
+          </p:cNvSpPr>
+          <p:nvPr>
+            <p:ph type="body" idx="1"/>
+          </p:nvPr>
+        </p:nvSpPr>
+        <p:spPr/>
+        <p:txBody>
+          <a:bodyPr/>
+          <a:lstStyle/>
+          <a:p>
+            <a:r>
+              <a:rPr lang="en-US" dirty="0" smtClean="0"/>
+              <a:t>Facebook 1280x630</a:t>
+            </a:r>
+            <a:endParaRPr lang="en-GB" dirty="0"/>
+          </a:p>
+        </p:txBody>
+      </p:sp>
+      <p:sp>
+        <p:nvSpPr>
+          <p:cNvPr id="4" name="Slide Number Placeholder 3"/>
+          <p:cNvSpPr>
+            <a:spLocks noGrp="1"/>
+          </p:cNvSpPr>
+          <p:nvPr>
+            <p:ph type="sldNum" sz="quarter" idx="10"/>
+          </p:nvPr>
+        </p:nvSpPr>
+        <p:spPr/>
+        <p:txBody>
+          <a:bodyPr/>
+          <a:lstStyle/>
+          <a:p>
+            <a:fld id="{427AF63E-676C-490F-B031-3BAEFE8BE401}" type="slidenum">
+              <a:rPr lang="en-GB" smtClean="0"/>
+              <a:t>2</a:t>
+            </a:fld>
+            <a:endParaRPr lang="en-GB"/>
+          </a:p>
+        </p:txBody>
+      </p:sp>
+    </p:spTree>
+    <p:extLst>
+      <p:ext uri="{BB962C8B-B14F-4D97-AF65-F5344CB8AC3E}">
+        <p14:creationId xmlns:p14="http://schemas.microsoft.com/office/powerpoint/2010/main" val="551983896"/>
+      </p:ext>
+    </p:extLst>
+  </p:cSld>
+  <p:clrMapOvr>
+    <a:masterClrMapping/>
+  </p:clrMapOvr>
+</p:notes>
+</file>
+
 <file path=ppt/slideLayouts/slideLayout1.xml><?xml version="1.0" encoding="utf-8"?>
 <p:sldLayout xmlns:a="http://schemas.openxmlformats.org/drawingml/2006/main" xmlns:r="http://schemas.openxmlformats.org/officeDocument/2006/relationships" xmlns:p="http://schemas.openxmlformats.org/presentationml/2006/main" type="title" preserve="1">
   <p:cSld name="Title Slide">
@@ -245,7 +687,7 @@
           <a:p>
             <a:fld id="{2ACA34EB-1D88-4E75-BE2F-6D09A74D6EB9}" type="datetimeFigureOut">
               <a:rPr lang="en-GB" smtClean="0"/>
-              <a:t>02/09/2017</a:t>
+              <a:t>09/09/2017</a:t>
             </a:fld>
             <a:endParaRPr lang="en-GB"/>
           </a:p>
@@ -415,7 +857,7 @@
           <a:p>
             <a:fld id="{2ACA34EB-1D88-4E75-BE2F-6D09A74D6EB9}" type="datetimeFigureOut">
               <a:rPr lang="en-GB" smtClean="0"/>
-              <a:t>02/09/2017</a:t>
+              <a:t>09/09/2017</a:t>
             </a:fld>
             <a:endParaRPr lang="en-GB"/>
           </a:p>
@@ -595,7 +1037,7 @@
           <a:p>
             <a:fld id="{2ACA34EB-1D88-4E75-BE2F-6D09A74D6EB9}" type="datetimeFigureOut">
               <a:rPr lang="en-GB" smtClean="0"/>
-              <a:t>02/09/2017</a:t>
+              <a:t>09/09/2017</a:t>
             </a:fld>
             <a:endParaRPr lang="en-GB"/>
           </a:p>
@@ -765,7 +1207,7 @@
           <a:p>
             <a:fld id="{2ACA34EB-1D88-4E75-BE2F-6D09A74D6EB9}" type="datetimeFigureOut">
               <a:rPr lang="en-GB" smtClean="0"/>
-              <a:t>02/09/2017</a:t>
+              <a:t>09/09/2017</a:t>
             </a:fld>
             <a:endParaRPr lang="en-GB"/>
           </a:p>
@@ -1011,7 +1453,7 @@
           <a:p>
             <a:fld id="{2ACA34EB-1D88-4E75-BE2F-6D09A74D6EB9}" type="datetimeFigureOut">
               <a:rPr lang="en-GB" smtClean="0"/>
-              <a:t>02/09/2017</a:t>
+              <a:t>09/09/2017</a:t>
             </a:fld>
             <a:endParaRPr lang="en-GB"/>
           </a:p>
@@ -1243,7 +1685,7 @@
           <a:p>
             <a:fld id="{2ACA34EB-1D88-4E75-BE2F-6D09A74D6EB9}" type="datetimeFigureOut">
               <a:rPr lang="en-GB" smtClean="0"/>
-              <a:t>02/09/2017</a:t>
+              <a:t>09/09/2017</a:t>
             </a:fld>
             <a:endParaRPr lang="en-GB"/>
           </a:p>
@@ -1610,7 +2052,7 @@
           <a:p>
             <a:fld id="{2ACA34EB-1D88-4E75-BE2F-6D09A74D6EB9}" type="datetimeFigureOut">
               <a:rPr lang="en-GB" smtClean="0"/>
-              <a:t>02/09/2017</a:t>
+              <a:t>09/09/2017</a:t>
             </a:fld>
             <a:endParaRPr lang="en-GB"/>
           </a:p>
@@ -1728,7 +2170,7 @@
           <a:p>
             <a:fld id="{2ACA34EB-1D88-4E75-BE2F-6D09A74D6EB9}" type="datetimeFigureOut">
               <a:rPr lang="en-GB" smtClean="0"/>
-              <a:t>02/09/2017</a:t>
+              <a:t>09/09/2017</a:t>
             </a:fld>
             <a:endParaRPr lang="en-GB"/>
           </a:p>
@@ -1823,7 +2265,7 @@
           <a:p>
             <a:fld id="{2ACA34EB-1D88-4E75-BE2F-6D09A74D6EB9}" type="datetimeFigureOut">
               <a:rPr lang="en-GB" smtClean="0"/>
-              <a:t>02/09/2017</a:t>
+              <a:t>09/09/2017</a:t>
             </a:fld>
             <a:endParaRPr lang="en-GB"/>
           </a:p>
@@ -2100,7 +2542,7 @@
           <a:p>
             <a:fld id="{2ACA34EB-1D88-4E75-BE2F-6D09A74D6EB9}" type="datetimeFigureOut">
               <a:rPr lang="en-GB" smtClean="0"/>
-              <a:t>02/09/2017</a:t>
+              <a:t>09/09/2017</a:t>
             </a:fld>
             <a:endParaRPr lang="en-GB"/>
           </a:p>
@@ -2353,7 +2795,7 @@
           <a:p>
             <a:fld id="{2ACA34EB-1D88-4E75-BE2F-6D09A74D6EB9}" type="datetimeFigureOut">
               <a:rPr lang="en-GB" smtClean="0"/>
-              <a:t>02/09/2017</a:t>
+              <a:t>09/09/2017</a:t>
             </a:fld>
             <a:endParaRPr lang="en-GB"/>
           </a:p>
@@ -2571,7 +3013,7 @@
           <a:p>
             <a:fld id="{2ACA34EB-1D88-4E75-BE2F-6D09A74D6EB9}" type="datetimeFigureOut">
               <a:rPr lang="en-GB" smtClean="0"/>
-              <a:t>02/09/2017</a:t>
+              <a:t>09/09/2017</a:t>
             </a:fld>
             <a:endParaRPr lang="en-GB"/>
           </a:p>
@@ -3087,7 +3529,7 @@
         <p:spPr>
           <a:xfrm>
             <a:off x="387824" y="2610791"/>
-            <a:ext cx="8805167" cy="2585323"/>
+            <a:ext cx="9475864" cy="2585323"/>
           </a:xfrm>
           <a:prstGeom prst="rect">
             <a:avLst/>
@@ -3122,7 +3564,29 @@
                   </a:schemeClr>
                 </a:solidFill>
               </a:rPr>
-              <a:t>Share export &amp; download links</a:t>
+              <a:t>Share </a:t>
+            </a:r>
+            <a:r>
+              <a:rPr lang="en-US" sz="5400" dirty="0" smtClean="0">
+                <a:solidFill>
+                  <a:schemeClr val="tx1">
+                    <a:lumMod val="75000"/>
+                    <a:lumOff val="25000"/>
+                  </a:schemeClr>
+                </a:solidFill>
+              </a:rPr>
+              <a:t>export-and-download </a:t>
+            </a:r>
+            <a:r>
+              <a:rPr lang="en-US" sz="5400" dirty="0" smtClean="0">
+                <a:solidFill>
+                  <a:schemeClr val="tx1">
+                    <a:lumMod val="75000"/>
+                    <a:lumOff val="25000"/>
+                  </a:schemeClr>
+                </a:solidFill>
+              </a:rPr>
+              <a:t>links</a:t>
             </a:r>
           </a:p>
           <a:p>
@@ -3226,6 +3690,278 @@
           <a:chExt cx="0" cy="0"/>
         </a:xfrm>
       </p:grpSpPr>
+      <p:pic>
+        <p:nvPicPr>
+          <p:cNvPr id="5" name="Picture 4"/>
+          <p:cNvPicPr>
+            <a:picLocks noChangeAspect="1"/>
+          </p:cNvPicPr>
+          <p:nvPr/>
+        </p:nvPicPr>
+        <p:blipFill>
+          <a:blip r:embed="rId3">
+            <a:extLst>
+              <a:ext uri="{28A0092B-C50C-407E-A947-70E740481C1C}">
+                <a14:useLocalDpi xmlns:a14="http://schemas.microsoft.com/office/drawing/2010/main" val="0"/>
+              </a:ext>
+            </a:extLst>
+          </a:blip>
+          <a:stretch>
+            <a:fillRect/>
+          </a:stretch>
+        </p:blipFill>
+        <p:spPr>
+          <a:xfrm>
+            <a:off x="7609628" y="4541010"/>
+            <a:ext cx="4508120" cy="1502707"/>
+          </a:xfrm>
+          <a:prstGeom prst="rect">
+            <a:avLst/>
+          </a:prstGeom>
+        </p:spPr>
+      </p:pic>
+      <p:pic>
+        <p:nvPicPr>
+          <p:cNvPr id="9" name="Picture 8"/>
+          <p:cNvPicPr>
+            <a:picLocks noChangeAspect="1"/>
+          </p:cNvPicPr>
+          <p:nvPr/>
+        </p:nvPicPr>
+        <p:blipFill>
+          <a:blip r:embed="rId4">
+            <a:extLst>
+              <a:ext uri="{28A0092B-C50C-407E-A947-70E740481C1C}">
+                <a14:useLocalDpi xmlns:a14="http://schemas.microsoft.com/office/drawing/2010/main" val="0"/>
+              </a:ext>
+            </a:extLst>
+          </a:blip>
+          <a:stretch>
+            <a:fillRect/>
+          </a:stretch>
+        </p:blipFill>
+        <p:spPr>
+          <a:xfrm>
+            <a:off x="2638955" y="1536252"/>
+            <a:ext cx="3196832" cy="655351"/>
+          </a:xfrm>
+          <a:prstGeom prst="rect">
+            <a:avLst/>
+          </a:prstGeom>
+        </p:spPr>
+      </p:pic>
+      <p:sp>
+        <p:nvSpPr>
+          <p:cNvPr id="10" name="TextBox 9"/>
+          <p:cNvSpPr txBox="1"/>
+          <p:nvPr/>
+        </p:nvSpPr>
+        <p:spPr>
+          <a:xfrm>
+            <a:off x="2500874" y="218662"/>
+            <a:ext cx="7010252" cy="1107996"/>
+          </a:xfrm>
+          <a:prstGeom prst="rect">
+            <a:avLst/>
+          </a:prstGeom>
+          <a:noFill/>
+        </p:spPr>
+        <p:txBody>
+          <a:bodyPr wrap="none" rtlCol="0">
+            <a:spAutoFit/>
+          </a:bodyPr>
+          <a:lstStyle/>
+          <a:p>
+            <a:r>
+              <a:rPr lang="en-US" sz="6600" b="1" dirty="0" smtClean="0">
+                <a:solidFill>
+                  <a:srgbClr val="0070C0"/>
+                </a:solidFill>
+                <a:latin typeface="Arial" panose="020B0604020202020204" pitchFamily="34" charset="0"/>
+                <a:cs typeface="Arial" panose="020B0604020202020204" pitchFamily="34" charset="0"/>
+              </a:rPr>
+              <a:t>Link Manager for</a:t>
+            </a:r>
+            <a:endParaRPr lang="en-GB" sz="6600" b="1" dirty="0">
+              <a:solidFill>
+                <a:srgbClr val="0070C0"/>
+              </a:solidFill>
+              <a:latin typeface="Arial" panose="020B0604020202020204" pitchFamily="34" charset="0"/>
+              <a:cs typeface="Arial" panose="020B0604020202020204" pitchFamily="34" charset="0"/>
+            </a:endParaRPr>
+          </a:p>
+        </p:txBody>
+      </p:sp>
+      <p:sp>
+        <p:nvSpPr>
+          <p:cNvPr id="11" name="TextBox 10"/>
+          <p:cNvSpPr txBox="1"/>
+          <p:nvPr/>
+        </p:nvSpPr>
+        <p:spPr>
+          <a:xfrm>
+            <a:off x="387824" y="2174055"/>
+            <a:ext cx="9475864" cy="2585323"/>
+          </a:xfrm>
+          <a:prstGeom prst="rect">
+            <a:avLst/>
+          </a:prstGeom>
+          <a:noFill/>
+        </p:spPr>
+        <p:txBody>
+          <a:bodyPr wrap="none" rtlCol="0">
+            <a:spAutoFit/>
+          </a:bodyPr>
+          <a:lstStyle/>
+          <a:p>
+            <a:r>
+              <a:rPr lang="en-US" sz="5400" dirty="0" smtClean="0">
+                <a:solidFill>
+                  <a:schemeClr val="tx1">
+                    <a:lumMod val="75000"/>
+                    <a:lumOff val="25000"/>
+                  </a:schemeClr>
+                </a:solidFill>
+              </a:rPr>
+              <a:t>Share direct download links</a:t>
+            </a:r>
+          </a:p>
+          <a:p>
+            <a:r>
+              <a:rPr lang="en-US" sz="5400" dirty="0" smtClean="0">
+                <a:solidFill>
+                  <a:schemeClr val="tx1">
+                    <a:lumMod val="75000"/>
+                    <a:lumOff val="25000"/>
+                  </a:schemeClr>
+                </a:solidFill>
+              </a:rPr>
+              <a:t>Share </a:t>
+            </a:r>
+            <a:r>
+              <a:rPr lang="en-US" sz="5400" dirty="0" smtClean="0">
+                <a:solidFill>
+                  <a:schemeClr val="tx1">
+                    <a:lumMod val="75000"/>
+                    <a:lumOff val="25000"/>
+                  </a:schemeClr>
+                </a:solidFill>
+              </a:rPr>
+              <a:t>export-and-download </a:t>
+            </a:r>
+            <a:r>
+              <a:rPr lang="en-US" sz="5400" dirty="0" smtClean="0">
+                <a:solidFill>
+                  <a:schemeClr val="tx1">
+                    <a:lumMod val="75000"/>
+                    <a:lumOff val="25000"/>
+                  </a:schemeClr>
+                </a:solidFill>
+              </a:rPr>
+              <a:t>links</a:t>
+            </a:r>
+          </a:p>
+          <a:p>
+            <a:r>
+              <a:rPr lang="en-US" sz="5400" dirty="0">
+                <a:solidFill>
+                  <a:schemeClr val="tx1">
+                    <a:lumMod val="75000"/>
+                    <a:lumOff val="25000"/>
+                  </a:schemeClr>
+                </a:solidFill>
+              </a:rPr>
+              <a:t> </a:t>
+            </a:r>
+            <a:r>
+              <a:rPr lang="en-US" sz="5400" dirty="0" smtClean="0">
+                <a:solidFill>
+                  <a:schemeClr val="tx1">
+                    <a:lumMod val="75000"/>
+                    <a:lumOff val="25000"/>
+                  </a:schemeClr>
+                </a:solidFill>
+              </a:rPr>
+              <a:t>  for native Google documents</a:t>
+            </a:r>
+            <a:endParaRPr lang="en-GB" sz="5400" dirty="0">
+              <a:solidFill>
+                <a:schemeClr val="tx1">
+                  <a:lumMod val="75000"/>
+                  <a:lumOff val="25000"/>
+                </a:schemeClr>
+              </a:solidFill>
+            </a:endParaRPr>
+          </a:p>
+        </p:txBody>
+      </p:sp>
+      <p:pic>
+        <p:nvPicPr>
+          <p:cNvPr id="2" name="Picture 1"/>
+          <p:cNvPicPr>
+            <a:picLocks noChangeAspect="1"/>
+          </p:cNvPicPr>
+          <p:nvPr/>
+        </p:nvPicPr>
+        <p:blipFill>
+          <a:blip r:embed="rId5" cstate="print">
+            <a:extLst>
+              <a:ext uri="{28A0092B-C50C-407E-A947-70E740481C1C}">
+                <a14:useLocalDpi xmlns:a14="http://schemas.microsoft.com/office/drawing/2010/main" val="0"/>
+              </a:ext>
+            </a:extLst>
+          </a:blip>
+          <a:stretch>
+            <a:fillRect/>
+          </a:stretch>
+        </p:blipFill>
+        <p:spPr>
+          <a:xfrm>
+            <a:off x="387824" y="368490"/>
+            <a:ext cx="1823113" cy="1823113"/>
+          </a:xfrm>
+          <a:prstGeom prst="rect">
+            <a:avLst/>
+          </a:prstGeom>
+        </p:spPr>
+      </p:pic>
+    </p:spTree>
+    <p:extLst>
+      <p:ext uri="{BB962C8B-B14F-4D97-AF65-F5344CB8AC3E}">
+        <p14:creationId xmlns:p14="http://schemas.microsoft.com/office/powerpoint/2010/main" val="3125561748"/>
+      </p:ext>
+    </p:extLst>
+  </p:cSld>
+  <p:clrMapOvr>
+    <a:masterClrMapping/>
+  </p:clrMapOvr>
+  <p:timing>
+    <p:tnLst>
+      <p:par>
+        <p:cTn id="1" dur="indefinite" restart="never" nodeType="tmRoot"/>
+      </p:par>
+    </p:tnLst>
+  </p:timing>
+</p:sld>
+</file>
+
+<file path=ppt/slides/slide3.xml><?xml version="1.0" encoding="utf-8"?>
+<p:sld xmlns:a="http://schemas.openxmlformats.org/drawingml/2006/main" xmlns:r="http://schemas.openxmlformats.org/officeDocument/2006/relationships" xmlns:p="http://schemas.openxmlformats.org/presentationml/2006/main">
+  <p:cSld>
+    <p:spTree>
+      <p:nvGrpSpPr>
+        <p:cNvPr id="1" name=""/>
+        <p:cNvGrpSpPr/>
+        <p:nvPr/>
+      </p:nvGrpSpPr>
+      <p:grpSpPr>
+        <a:xfrm>
+          <a:off x="0" y="0"/>
+          <a:ext cx="0" cy="0"/>
+          <a:chOff x="0" y="0"/>
+          <a:chExt cx="0" cy="0"/>
+        </a:xfrm>
+      </p:grpSpPr>
       <p:sp>
         <p:nvSpPr>
           <p:cNvPr id="4" name="Oval 3"/>
@@ -3677,7 +4413,7 @@
 </p:sld>
 </file>
 
-<file path=ppt/slides/slide3.xml><?xml version="1.0" encoding="utf-8"?>
+<file path=ppt/slides/slide4.xml><?xml version="1.0" encoding="utf-8"?>
 <p:sld xmlns:a="http://schemas.openxmlformats.org/drawingml/2006/main" xmlns:r="http://schemas.openxmlformats.org/officeDocument/2006/relationships" xmlns:p="http://schemas.openxmlformats.org/presentationml/2006/main">
   <p:cSld>
     <p:bg>
@@ -4425,4 +5161,265 @@
     </a:ext>
   </a:extLst>
 </a:theme>
+</file>
+
+<file path=ppt/theme/theme2.xml><?xml version="1.0" encoding="utf-8"?>
+<a:theme xmlns:a="http://schemas.openxmlformats.org/drawingml/2006/main" name="Office Theme">
+  <a:themeElements>
+    <a:clrScheme name="Office">
+      <a:dk1>
+        <a:sysClr val="windowText" lastClr="000000"/>
+      </a:dk1>
+      <a:lt1>
+        <a:sysClr val="window" lastClr="FFFFFF"/>
+      </a:lt1>
+      <a:dk2>
+        <a:srgbClr val="44546A"/>
+      </a:dk2>
+      <a:lt2>
+        <a:srgbClr val="E7E6E6"/>
+      </a:lt2>
+      <a:accent1>
+        <a:srgbClr val="5B9BD5"/>
+      </a:accent1>
+      <a:accent2>
+        <a:srgbClr val="ED7D31"/>
+      </a:accent2>
+      <a:accent3>
+        <a:srgbClr val="A5A5A5"/>
+      </a:accent3>
+      <a:accent4>
+        <a:srgbClr val="FFC000"/>
+      </a:accent4>
+      <a:accent5>
+        <a:srgbClr val="4472C4"/>
+      </a:accent5>
+      <a:accent6>
+        <a:srgbClr val="70AD47"/>
+      </a:accent6>
+      <a:hlink>
+        <a:srgbClr val="0563C1"/>
+      </a:hlink>
+      <a:folHlink>
+        <a:srgbClr val="954F72"/>
+      </a:folHlink>
+    </a:clrScheme>
+    <a:fontScheme name="Office">
+      <a:majorFont>
+        <a:latin typeface="Calibri Light" panose="020F0302020204030204"/>
+        <a:ea typeface=""/>
+        <a:cs typeface=""/>
+        <a:font script="Jpan" typeface="ＭＳ Ｐゴシック"/>
+        <a:font script="Hang" typeface="맑은 고딕"/>
+        <a:font script="Hans" typeface="宋体"/>
+        <a:font script="Hant" typeface="新細明體"/>
+        <a:font script="Arab" typeface="Times New Roman"/>
+        <a:font script="Hebr" typeface="Times New Roman"/>
+        <a:font script="Thai" typeface="Angsana New"/>
+        <a:font script="Ethi" typeface="Nyala"/>
+        <a:font script="Beng" typeface="Vrinda"/>
+        <a:font script="Gujr" typeface="Shruti"/>
+        <a:font script="Khmr" typeface="MoolBoran"/>
+        <a:font script="Knda" typeface="Tunga"/>
+        <a:font script="Guru" typeface="Raavi"/>
+        <a:font script="Cans" typeface="Euphemia"/>
+        <a:font script="Cher" typeface="Plantagenet Cherokee"/>
+        <a:font script="Yiii" typeface="Microsoft Yi Baiti"/>
+        <a:font script="Tibt" typeface="Microsoft Himalaya"/>
+        <a:font script="Thaa" typeface="MV Boli"/>
+        <a:font script="Deva" typeface="Mangal"/>
+        <a:font script="Telu" typeface="Gautami"/>
+        <a:font script="Taml" typeface="Latha"/>
+        <a:font script="Syrc" typeface="Estrangelo Edessa"/>
+        <a:font script="Orya" typeface="Kalinga"/>
+        <a:font script="Mlym" typeface="Kartika"/>
+        <a:font script="Laoo" typeface="DokChampa"/>
+        <a:font script="Sinh" typeface="Iskoola Pota"/>
+        <a:font script="Mong" typeface="Mongolian Baiti"/>
+        <a:font script="Viet" typeface="Times New Roman"/>
+        <a:font script="Uigh" typeface="Microsoft Uighur"/>
+        <a:font script="Geor" typeface="Sylfaen"/>
+      </a:majorFont>
+      <a:minorFont>
+        <a:latin typeface="Calibri" panose="020F0502020204030204"/>
+        <a:ea typeface=""/>
+        <a:cs typeface=""/>
+        <a:font script="Jpan" typeface="ＭＳ Ｐゴシック"/>
+        <a:font script="Hang" typeface="맑은 고딕"/>
+        <a:font script="Hans" typeface="宋体"/>
+        <a:font script="Hant" typeface="新細明體"/>
+        <a:font script="Arab" typeface="Arial"/>
+        <a:font script="Hebr" typeface="Arial"/>
+        <a:font script="Thai" typeface="Cordia New"/>
+        <a:font script="Ethi" typeface="Nyala"/>
+        <a:font script="Beng" typeface="Vrinda"/>
+        <a:font script="Gujr" typeface="Shruti"/>
+        <a:font script="Khmr" typeface="DaunPenh"/>
+        <a:font script="Knda" typeface="Tunga"/>
+        <a:font script="Guru" typeface="Raavi"/>
+        <a:font script="Cans" typeface="Euphemia"/>
+        <a:font script="Cher" typeface="Plantagenet Cherokee"/>
+        <a:font script="Yiii" typeface="Microsoft Yi Baiti"/>
+        <a:font script="Tibt" typeface="Microsoft Himalaya"/>
+        <a:font script="Thaa" typeface="MV Boli"/>
+        <a:font script="Deva" typeface="Mangal"/>
+        <a:font script="Telu" typeface="Gautami"/>
+        <a:font script="Taml" typeface="Latha"/>
+        <a:font script="Syrc" typeface="Estrangelo Edessa"/>
+        <a:font script="Orya" typeface="Kalinga"/>
+        <a:font script="Mlym" typeface="Kartika"/>
+        <a:font script="Laoo" typeface="DokChampa"/>
+        <a:font script="Sinh" typeface="Iskoola Pota"/>
+        <a:font script="Mong" typeface="Mongolian Baiti"/>
+        <a:font script="Viet" typeface="Arial"/>
+        <a:font script="Uigh" typeface="Microsoft Uighur"/>
+        <a:font script="Geor" typeface="Sylfaen"/>
+      </a:minorFont>
+    </a:fontScheme>
+    <a:fmtScheme name="Office">
+      <a:fillStyleLst>
+        <a:solidFill>
+          <a:schemeClr val="phClr"/>
+        </a:solidFill>
+        <a:gradFill rotWithShape="1">
+          <a:gsLst>
+            <a:gs pos="0">
+              <a:schemeClr val="phClr">
+                <a:lumMod val="110000"/>
+                <a:satMod val="105000"/>
+                <a:tint val="67000"/>
+              </a:schemeClr>
+            </a:gs>
+            <a:gs pos="50000">
+              <a:schemeClr val="phClr">
+                <a:lumMod val="105000"/>
+                <a:satMod val="103000"/>
+                <a:tint val="73000"/>
+              </a:schemeClr>
+            </a:gs>
+            <a:gs pos="100000">
+              <a:schemeClr val="phClr">
+                <a:lumMod val="105000"/>
+                <a:satMod val="109000"/>
+                <a:tint val="81000"/>
+              </a:schemeClr>
+            </a:gs>
+          </a:gsLst>
+          <a:lin ang="5400000" scaled="0"/>
+        </a:gradFill>
+        <a:gradFill rotWithShape="1">
+          <a:gsLst>
+            <a:gs pos="0">
+              <a:schemeClr val="phClr">
+                <a:satMod val="103000"/>
+                <a:lumMod val="102000"/>
+                <a:tint val="94000"/>
+              </a:schemeClr>
+            </a:gs>
+            <a:gs pos="50000">
+              <a:schemeClr val="phClr">
+                <a:satMod val="110000"/>
+                <a:lumMod val="100000"/>
+                <a:shade val="100000"/>
+              </a:schemeClr>
+            </a:gs>
+            <a:gs pos="100000">
+              <a:schemeClr val="phClr">
+                <a:lumMod val="99000"/>
+                <a:satMod val="120000"/>
+                <a:shade val="78000"/>
+              </a:schemeClr>
+            </a:gs>
+          </a:gsLst>
+          <a:lin ang="5400000" scaled="0"/>
+        </a:gradFill>
+      </a:fillStyleLst>
+      <a:lnStyleLst>
+        <a:ln w="6350" cap="flat" cmpd="sng" algn="ctr">
+          <a:solidFill>
+            <a:schemeClr val="phClr"/>
+          </a:solidFill>
+          <a:prstDash val="solid"/>
+          <a:miter lim="800000"/>
+        </a:ln>
+        <a:ln w="12700" cap="flat" cmpd="sng" algn="ctr">
+          <a:solidFill>
+            <a:schemeClr val="phClr"/>
+          </a:solidFill>
+          <a:prstDash val="solid"/>
+          <a:miter lim="800000"/>
+        </a:ln>
+        <a:ln w="19050" cap="flat" cmpd="sng" algn="ctr">
+          <a:solidFill>
+            <a:schemeClr val="phClr"/>
+          </a:solidFill>
+          <a:prstDash val="solid"/>
+          <a:miter lim="800000"/>
+        </a:ln>
+      </a:lnStyleLst>
+      <a:effectStyleLst>
+        <a:effectStyle>
+          <a:effectLst/>
+        </a:effectStyle>
+        <a:effectStyle>
+          <a:effectLst/>
+        </a:effectStyle>
+        <a:effectStyle>
+          <a:effectLst>
+            <a:outerShdw blurRad="57150" dist="19050" dir="5400000" algn="ctr" rotWithShape="0">
+              <a:srgbClr val="000000">
+                <a:alpha val="63000"/>
+              </a:srgbClr>
+            </a:outerShdw>
+          </a:effectLst>
+        </a:effectStyle>
+      </a:effectStyleLst>
+      <a:bgFillStyleLst>
+        <a:solidFill>
+          <a:schemeClr val="phClr"/>
+        </a:solidFill>
+        <a:solidFill>
+          <a:schemeClr val="phClr">
+            <a:tint val="95000"/>
+            <a:satMod val="170000"/>
+          </a:schemeClr>
+        </a:solidFill>
+        <a:gradFill rotWithShape="1">
+          <a:gsLst>
+            <a:gs pos="0">
+              <a:schemeClr val="phClr">
+                <a:tint val="93000"/>
+                <a:satMod val="150000"/>
+                <a:shade val="98000"/>
+                <a:lumMod val="102000"/>
+              </a:schemeClr>
+            </a:gs>
+            <a:gs pos="50000">
+              <a:schemeClr val="phClr">
+                <a:tint val="98000"/>
+                <a:satMod val="130000"/>
+                <a:shade val="90000"/>
+                <a:lumMod val="103000"/>
+              </a:schemeClr>
+            </a:gs>
+            <a:gs pos="100000">
+              <a:schemeClr val="phClr">
+                <a:shade val="63000"/>
+                <a:satMod val="120000"/>
+              </a:schemeClr>
+            </a:gs>
+          </a:gsLst>
+          <a:lin ang="5400000" scaled="0"/>
+        </a:gradFill>
+      </a:bgFillStyleLst>
+    </a:fmtScheme>
+  </a:themeElements>
+  <a:objectDefaults/>
+  <a:extraClrSchemeLst/>
+  <a:extLst>
+    <a:ext uri="{05A4C25C-085E-4340-85A3-A5531E510DB2}">
+      <thm15:themeFamily xmlns:thm15="http://schemas.microsoft.com/office/thememl/2012/main" name="Office Theme" id="{62F939B6-93AF-4DB8-9C6B-D6C7DFDC589F}" vid="{4A3C46E8-61CC-4603-A589-7422A47A8E4A}"/>
+    </a:ext>
+  </a:extLst>
+</a:theme>
 </file>
</xml_diff>

<commit_message>
add cws promo 920x680
</commit_message>
<xml_diff>
--- a/dist-env/src/cws/app-promo/promo.pptx
+++ b/dist-env/src/cws/app-promo/promo.pptx
@@ -5,13 +5,15 @@
     <p:sldMasterId id="2147483648" r:id="rId1"/>
   </p:sldMasterIdLst>
   <p:notesMasterIdLst>
-    <p:notesMasterId r:id="rId6"/>
+    <p:notesMasterId r:id="rId8"/>
   </p:notesMasterIdLst>
   <p:sldIdLst>
     <p:sldId id="256" r:id="rId2"/>
-    <p:sldId id="259" r:id="rId3"/>
-    <p:sldId id="257" r:id="rId4"/>
-    <p:sldId id="258" r:id="rId5"/>
+    <p:sldId id="261" r:id="rId3"/>
+    <p:sldId id="259" r:id="rId4"/>
+    <p:sldId id="257" r:id="rId5"/>
+    <p:sldId id="258" r:id="rId6"/>
+    <p:sldId id="260" r:id="rId7"/>
   </p:sldIdLst>
   <p:sldSz cx="12192000" cy="6858000"/>
   <p:notesSz cx="6858000" cy="9144000"/>
@@ -200,7 +202,7 @@
           <a:p>
             <a:fld id="{DA1CD8E3-66EA-4860-B6DD-845275B8FDA1}" type="datetimeFigureOut">
               <a:rPr lang="en-GB" smtClean="0"/>
-              <a:t>09/09/2017</a:t>
+              <a:t>10/09/2017</a:t>
             </a:fld>
             <a:endParaRPr lang="en-GB"/>
           </a:p>
@@ -514,7 +516,95 @@
           <a:p>
             <a:r>
               <a:rPr lang="en-US" dirty="0" smtClean="0"/>
-              <a:t>Facebook 1280x630</a:t>
+              <a:t>CWS 440x280</a:t>
+            </a:r>
+            <a:endParaRPr lang="en-GB" dirty="0"/>
+          </a:p>
+        </p:txBody>
+      </p:sp>
+      <p:sp>
+        <p:nvSpPr>
+          <p:cNvPr id="4" name="Slide Number Placeholder 3"/>
+          <p:cNvSpPr>
+            <a:spLocks noGrp="1"/>
+          </p:cNvSpPr>
+          <p:nvPr>
+            <p:ph type="sldNum" sz="quarter" idx="10"/>
+          </p:nvPr>
+        </p:nvSpPr>
+        <p:spPr/>
+        <p:txBody>
+          <a:bodyPr/>
+          <a:lstStyle/>
+          <a:p>
+            <a:fld id="{427AF63E-676C-490F-B031-3BAEFE8BE401}" type="slidenum">
+              <a:rPr lang="en-GB" smtClean="0"/>
+              <a:t>1</a:t>
+            </a:fld>
+            <a:endParaRPr lang="en-GB"/>
+          </a:p>
+        </p:txBody>
+      </p:sp>
+    </p:spTree>
+    <p:extLst>
+      <p:ext uri="{BB962C8B-B14F-4D97-AF65-F5344CB8AC3E}">
+        <p14:creationId xmlns:p14="http://schemas.microsoft.com/office/powerpoint/2010/main" val="3955316899"/>
+      </p:ext>
+    </p:extLst>
+  </p:cSld>
+  <p:clrMapOvr>
+    <a:masterClrMapping/>
+  </p:clrMapOvr>
+</p:notes>
+</file>
+
+<file path=ppt/notesSlides/notesSlide2.xml><?xml version="1.0" encoding="utf-8"?>
+<p:notes xmlns:a="http://schemas.openxmlformats.org/drawingml/2006/main" xmlns:r="http://schemas.openxmlformats.org/officeDocument/2006/relationships" xmlns:p="http://schemas.openxmlformats.org/presentationml/2006/main">
+  <p:cSld>
+    <p:spTree>
+      <p:nvGrpSpPr>
+        <p:cNvPr id="1" name=""/>
+        <p:cNvGrpSpPr/>
+        <p:nvPr/>
+      </p:nvGrpSpPr>
+      <p:grpSpPr>
+        <a:xfrm>
+          <a:off x="0" y="0"/>
+          <a:ext cx="0" cy="0"/>
+          <a:chOff x="0" y="0"/>
+          <a:chExt cx="0" cy="0"/>
+        </a:xfrm>
+      </p:grpSpPr>
+      <p:sp>
+        <p:nvSpPr>
+          <p:cNvPr id="2" name="Slide Image Placeholder 1"/>
+          <p:cNvSpPr>
+            <a:spLocks noGrp="1" noRot="1" noChangeAspect="1"/>
+          </p:cNvSpPr>
+          <p:nvPr>
+            <p:ph type="sldImg"/>
+          </p:nvPr>
+        </p:nvSpPr>
+        <p:spPr/>
+      </p:sp>
+      <p:sp>
+        <p:nvSpPr>
+          <p:cNvPr id="3" name="Notes Placeholder 2"/>
+          <p:cNvSpPr>
+            <a:spLocks noGrp="1"/>
+          </p:cNvSpPr>
+          <p:nvPr>
+            <p:ph type="body" idx="1"/>
+          </p:nvPr>
+        </p:nvSpPr>
+        <p:spPr/>
+        <p:txBody>
+          <a:bodyPr/>
+          <a:lstStyle/>
+          <a:p>
+            <a:r>
+              <a:rPr lang="en-US" dirty="0" smtClean="0"/>
+              <a:t>CWS 920x680</a:t>
             </a:r>
             <a:endParaRPr lang="en-GB" dirty="0"/>
           </a:p>
@@ -546,7 +636,183 @@
     </p:spTree>
     <p:extLst>
       <p:ext uri="{BB962C8B-B14F-4D97-AF65-F5344CB8AC3E}">
+        <p14:creationId xmlns:p14="http://schemas.microsoft.com/office/powerpoint/2010/main" val="1133928042"/>
+      </p:ext>
+    </p:extLst>
+  </p:cSld>
+  <p:clrMapOvr>
+    <a:masterClrMapping/>
+  </p:clrMapOvr>
+</p:notes>
+</file>
+
+<file path=ppt/notesSlides/notesSlide3.xml><?xml version="1.0" encoding="utf-8"?>
+<p:notes xmlns:a="http://schemas.openxmlformats.org/drawingml/2006/main" xmlns:r="http://schemas.openxmlformats.org/officeDocument/2006/relationships" xmlns:p="http://schemas.openxmlformats.org/presentationml/2006/main">
+  <p:cSld>
+    <p:spTree>
+      <p:nvGrpSpPr>
+        <p:cNvPr id="1" name=""/>
+        <p:cNvGrpSpPr/>
+        <p:nvPr/>
+      </p:nvGrpSpPr>
+      <p:grpSpPr>
+        <a:xfrm>
+          <a:off x="0" y="0"/>
+          <a:ext cx="0" cy="0"/>
+          <a:chOff x="0" y="0"/>
+          <a:chExt cx="0" cy="0"/>
+        </a:xfrm>
+      </p:grpSpPr>
+      <p:sp>
+        <p:nvSpPr>
+          <p:cNvPr id="2" name="Slide Image Placeholder 1"/>
+          <p:cNvSpPr>
+            <a:spLocks noGrp="1" noRot="1" noChangeAspect="1"/>
+          </p:cNvSpPr>
+          <p:nvPr>
+            <p:ph type="sldImg"/>
+          </p:nvPr>
+        </p:nvSpPr>
+        <p:spPr/>
+      </p:sp>
+      <p:sp>
+        <p:nvSpPr>
+          <p:cNvPr id="3" name="Notes Placeholder 2"/>
+          <p:cNvSpPr>
+            <a:spLocks noGrp="1"/>
+          </p:cNvSpPr>
+          <p:nvPr>
+            <p:ph type="body" idx="1"/>
+          </p:nvPr>
+        </p:nvSpPr>
+        <p:spPr/>
+        <p:txBody>
+          <a:bodyPr/>
+          <a:lstStyle/>
+          <a:p>
+            <a:r>
+              <a:rPr lang="en-US" dirty="0" smtClean="0"/>
+              <a:t>Facebook 1280x630</a:t>
+            </a:r>
+            <a:endParaRPr lang="en-GB" dirty="0"/>
+          </a:p>
+        </p:txBody>
+      </p:sp>
+      <p:sp>
+        <p:nvSpPr>
+          <p:cNvPr id="4" name="Slide Number Placeholder 3"/>
+          <p:cNvSpPr>
+            <a:spLocks noGrp="1"/>
+          </p:cNvSpPr>
+          <p:nvPr>
+            <p:ph type="sldNum" sz="quarter" idx="10"/>
+          </p:nvPr>
+        </p:nvSpPr>
+        <p:spPr/>
+        <p:txBody>
+          <a:bodyPr/>
+          <a:lstStyle/>
+          <a:p>
+            <a:fld id="{427AF63E-676C-490F-B031-3BAEFE8BE401}" type="slidenum">
+              <a:rPr lang="en-GB" smtClean="0"/>
+              <a:t>3</a:t>
+            </a:fld>
+            <a:endParaRPr lang="en-GB"/>
+          </a:p>
+        </p:txBody>
+      </p:sp>
+    </p:spTree>
+    <p:extLst>
+      <p:ext uri="{BB962C8B-B14F-4D97-AF65-F5344CB8AC3E}">
         <p14:creationId xmlns:p14="http://schemas.microsoft.com/office/powerpoint/2010/main" val="551983896"/>
+      </p:ext>
+    </p:extLst>
+  </p:cSld>
+  <p:clrMapOvr>
+    <a:masterClrMapping/>
+  </p:clrMapOvr>
+</p:notes>
+</file>
+
+<file path=ppt/notesSlides/notesSlide4.xml><?xml version="1.0" encoding="utf-8"?>
+<p:notes xmlns:a="http://schemas.openxmlformats.org/drawingml/2006/main" xmlns:r="http://schemas.openxmlformats.org/officeDocument/2006/relationships" xmlns:p="http://schemas.openxmlformats.org/presentationml/2006/main">
+  <p:cSld>
+    <p:spTree>
+      <p:nvGrpSpPr>
+        <p:cNvPr id="1" name=""/>
+        <p:cNvGrpSpPr/>
+        <p:nvPr/>
+      </p:nvGrpSpPr>
+      <p:grpSpPr>
+        <a:xfrm>
+          <a:off x="0" y="0"/>
+          <a:ext cx="0" cy="0"/>
+          <a:chOff x="0" y="0"/>
+          <a:chExt cx="0" cy="0"/>
+        </a:xfrm>
+      </p:grpSpPr>
+      <p:sp>
+        <p:nvSpPr>
+          <p:cNvPr id="2" name="Slide Image Placeholder 1"/>
+          <p:cNvSpPr>
+            <a:spLocks noGrp="1" noRot="1" noChangeAspect="1"/>
+          </p:cNvSpPr>
+          <p:nvPr>
+            <p:ph type="sldImg"/>
+          </p:nvPr>
+        </p:nvSpPr>
+        <p:spPr/>
+      </p:sp>
+      <p:sp>
+        <p:nvSpPr>
+          <p:cNvPr id="3" name="Notes Placeholder 2"/>
+          <p:cNvSpPr>
+            <a:spLocks noGrp="1"/>
+          </p:cNvSpPr>
+          <p:nvPr>
+            <p:ph type="body" idx="1"/>
+          </p:nvPr>
+        </p:nvSpPr>
+        <p:spPr/>
+        <p:txBody>
+          <a:bodyPr/>
+          <a:lstStyle/>
+          <a:p>
+            <a:r>
+              <a:rPr lang="en-US" dirty="0" smtClean="0"/>
+              <a:t>icon</a:t>
+            </a:r>
+            <a:endParaRPr lang="en-GB" dirty="0"/>
+          </a:p>
+        </p:txBody>
+      </p:sp>
+      <p:sp>
+        <p:nvSpPr>
+          <p:cNvPr id="4" name="Slide Number Placeholder 3"/>
+          <p:cNvSpPr>
+            <a:spLocks noGrp="1"/>
+          </p:cNvSpPr>
+          <p:nvPr>
+            <p:ph type="sldNum" sz="quarter" idx="10"/>
+          </p:nvPr>
+        </p:nvSpPr>
+        <p:spPr/>
+        <p:txBody>
+          <a:bodyPr/>
+          <a:lstStyle/>
+          <a:p>
+            <a:fld id="{427AF63E-676C-490F-B031-3BAEFE8BE401}" type="slidenum">
+              <a:rPr lang="en-GB" smtClean="0"/>
+              <a:t>5</a:t>
+            </a:fld>
+            <a:endParaRPr lang="en-GB"/>
+          </a:p>
+        </p:txBody>
+      </p:sp>
+    </p:spTree>
+    <p:extLst>
+      <p:ext uri="{BB962C8B-B14F-4D97-AF65-F5344CB8AC3E}">
+        <p14:creationId xmlns:p14="http://schemas.microsoft.com/office/powerpoint/2010/main" val="3259996585"/>
       </p:ext>
     </p:extLst>
   </p:cSld>
@@ -687,7 +953,7 @@
           <a:p>
             <a:fld id="{2ACA34EB-1D88-4E75-BE2F-6D09A74D6EB9}" type="datetimeFigureOut">
               <a:rPr lang="en-GB" smtClean="0"/>
-              <a:t>09/09/2017</a:t>
+              <a:t>10/09/2017</a:t>
             </a:fld>
             <a:endParaRPr lang="en-GB"/>
           </a:p>
@@ -857,7 +1123,7 @@
           <a:p>
             <a:fld id="{2ACA34EB-1D88-4E75-BE2F-6D09A74D6EB9}" type="datetimeFigureOut">
               <a:rPr lang="en-GB" smtClean="0"/>
-              <a:t>09/09/2017</a:t>
+              <a:t>10/09/2017</a:t>
             </a:fld>
             <a:endParaRPr lang="en-GB"/>
           </a:p>
@@ -1037,7 +1303,7 @@
           <a:p>
             <a:fld id="{2ACA34EB-1D88-4E75-BE2F-6D09A74D6EB9}" type="datetimeFigureOut">
               <a:rPr lang="en-GB" smtClean="0"/>
-              <a:t>09/09/2017</a:t>
+              <a:t>10/09/2017</a:t>
             </a:fld>
             <a:endParaRPr lang="en-GB"/>
           </a:p>
@@ -1207,7 +1473,7 @@
           <a:p>
             <a:fld id="{2ACA34EB-1D88-4E75-BE2F-6D09A74D6EB9}" type="datetimeFigureOut">
               <a:rPr lang="en-GB" smtClean="0"/>
-              <a:t>09/09/2017</a:t>
+              <a:t>10/09/2017</a:t>
             </a:fld>
             <a:endParaRPr lang="en-GB"/>
           </a:p>
@@ -1453,7 +1719,7 @@
           <a:p>
             <a:fld id="{2ACA34EB-1D88-4E75-BE2F-6D09A74D6EB9}" type="datetimeFigureOut">
               <a:rPr lang="en-GB" smtClean="0"/>
-              <a:t>09/09/2017</a:t>
+              <a:t>10/09/2017</a:t>
             </a:fld>
             <a:endParaRPr lang="en-GB"/>
           </a:p>
@@ -1685,7 +1951,7 @@
           <a:p>
             <a:fld id="{2ACA34EB-1D88-4E75-BE2F-6D09A74D6EB9}" type="datetimeFigureOut">
               <a:rPr lang="en-GB" smtClean="0"/>
-              <a:t>09/09/2017</a:t>
+              <a:t>10/09/2017</a:t>
             </a:fld>
             <a:endParaRPr lang="en-GB"/>
           </a:p>
@@ -2052,7 +2318,7 @@
           <a:p>
             <a:fld id="{2ACA34EB-1D88-4E75-BE2F-6D09A74D6EB9}" type="datetimeFigureOut">
               <a:rPr lang="en-GB" smtClean="0"/>
-              <a:t>09/09/2017</a:t>
+              <a:t>10/09/2017</a:t>
             </a:fld>
             <a:endParaRPr lang="en-GB"/>
           </a:p>
@@ -2170,7 +2436,7 @@
           <a:p>
             <a:fld id="{2ACA34EB-1D88-4E75-BE2F-6D09A74D6EB9}" type="datetimeFigureOut">
               <a:rPr lang="en-GB" smtClean="0"/>
-              <a:t>09/09/2017</a:t>
+              <a:t>10/09/2017</a:t>
             </a:fld>
             <a:endParaRPr lang="en-GB"/>
           </a:p>
@@ -2265,7 +2531,7 @@
           <a:p>
             <a:fld id="{2ACA34EB-1D88-4E75-BE2F-6D09A74D6EB9}" type="datetimeFigureOut">
               <a:rPr lang="en-GB" smtClean="0"/>
-              <a:t>09/09/2017</a:t>
+              <a:t>10/09/2017</a:t>
             </a:fld>
             <a:endParaRPr lang="en-GB"/>
           </a:p>
@@ -2542,7 +2808,7 @@
           <a:p>
             <a:fld id="{2ACA34EB-1D88-4E75-BE2F-6D09A74D6EB9}" type="datetimeFigureOut">
               <a:rPr lang="en-GB" smtClean="0"/>
-              <a:t>09/09/2017</a:t>
+              <a:t>10/09/2017</a:t>
             </a:fld>
             <a:endParaRPr lang="en-GB"/>
           </a:p>
@@ -2795,7 +3061,7 @@
           <a:p>
             <a:fld id="{2ACA34EB-1D88-4E75-BE2F-6D09A74D6EB9}" type="datetimeFigureOut">
               <a:rPr lang="en-GB" smtClean="0"/>
-              <a:t>09/09/2017</a:t>
+              <a:t>10/09/2017</a:t>
             </a:fld>
             <a:endParaRPr lang="en-GB"/>
           </a:p>
@@ -3013,7 +3279,7 @@
           <a:p>
             <a:fld id="{2ACA34EB-1D88-4E75-BE2F-6D09A74D6EB9}" type="datetimeFigureOut">
               <a:rPr lang="en-GB" smtClean="0"/>
-              <a:t>09/09/2017</a:t>
+              <a:t>10/09/2017</a:t>
             </a:fld>
             <a:endParaRPr lang="en-GB"/>
           </a:p>
@@ -3427,7 +3693,7 @@
           <p:nvPr/>
         </p:nvPicPr>
         <p:blipFill>
-          <a:blip r:embed="rId2">
+          <a:blip r:embed="rId3">
             <a:extLst>
               <a:ext uri="{28A0092B-C50C-407E-A947-70E740481C1C}">
                 <a14:useLocalDpi xmlns:a14="http://schemas.microsoft.com/office/drawing/2010/main" val="0"/>
@@ -3457,7 +3723,7 @@
           <p:nvPr/>
         </p:nvPicPr>
         <p:blipFill>
-          <a:blip r:embed="rId3">
+          <a:blip r:embed="rId4">
             <a:extLst>
               <a:ext uri="{28A0092B-C50C-407E-A947-70E740481C1C}">
                 <a14:useLocalDpi xmlns:a14="http://schemas.microsoft.com/office/drawing/2010/main" val="0"/>
@@ -3564,29 +3830,7 @@
                   </a:schemeClr>
                 </a:solidFill>
               </a:rPr>
-              <a:t>Share </a:t>
-            </a:r>
-            <a:r>
-              <a:rPr lang="en-US" sz="5400" dirty="0" smtClean="0">
-                <a:solidFill>
-                  <a:schemeClr val="tx1">
-                    <a:lumMod val="75000"/>
-                    <a:lumOff val="25000"/>
-                  </a:schemeClr>
-                </a:solidFill>
-              </a:rPr>
-              <a:t>export-and-download </a:t>
-            </a:r>
-            <a:r>
-              <a:rPr lang="en-US" sz="5400" dirty="0" smtClean="0">
-                <a:solidFill>
-                  <a:schemeClr val="tx1">
-                    <a:lumMod val="75000"/>
-                    <a:lumOff val="25000"/>
-                  </a:schemeClr>
-                </a:solidFill>
-              </a:rPr>
-              <a:t>links</a:t>
+              <a:t>Share export-and-download links</a:t>
             </a:r>
           </a:p>
           <a:p>
@@ -3632,7 +3876,7 @@
           <p:nvPr/>
         </p:nvPicPr>
         <p:blipFill>
-          <a:blip r:embed="rId4" cstate="print">
+          <a:blip r:embed="rId5" cstate="print">
             <a:extLst>
               <a:ext uri="{28A0092B-C50C-407E-A947-70E740481C1C}">
                 <a14:useLocalDpi xmlns:a14="http://schemas.microsoft.com/office/drawing/2010/main" val="0"/>
@@ -3712,6 +3956,256 @@
         </p:blipFill>
         <p:spPr>
           <a:xfrm>
+            <a:off x="4329518" y="5168818"/>
+            <a:ext cx="4508120" cy="1502707"/>
+          </a:xfrm>
+          <a:prstGeom prst="rect">
+            <a:avLst/>
+          </a:prstGeom>
+        </p:spPr>
+      </p:pic>
+      <p:pic>
+        <p:nvPicPr>
+          <p:cNvPr id="9" name="Picture 8"/>
+          <p:cNvPicPr>
+            <a:picLocks noChangeAspect="1"/>
+          </p:cNvPicPr>
+          <p:nvPr/>
+        </p:nvPicPr>
+        <p:blipFill>
+          <a:blip r:embed="rId4">
+            <a:extLst>
+              <a:ext uri="{28A0092B-C50C-407E-A947-70E740481C1C}">
+                <a14:useLocalDpi xmlns:a14="http://schemas.microsoft.com/office/drawing/2010/main" val="0"/>
+              </a:ext>
+            </a:extLst>
+          </a:blip>
+          <a:stretch>
+            <a:fillRect/>
+          </a:stretch>
+        </p:blipFill>
+        <p:spPr>
+          <a:xfrm>
+            <a:off x="2638955" y="1536252"/>
+            <a:ext cx="3196832" cy="655351"/>
+          </a:xfrm>
+          <a:prstGeom prst="rect">
+            <a:avLst/>
+          </a:prstGeom>
+        </p:spPr>
+      </p:pic>
+      <p:sp>
+        <p:nvSpPr>
+          <p:cNvPr id="10" name="TextBox 9"/>
+          <p:cNvSpPr txBox="1"/>
+          <p:nvPr/>
+        </p:nvSpPr>
+        <p:spPr>
+          <a:xfrm>
+            <a:off x="2500874" y="218662"/>
+            <a:ext cx="6381875" cy="1015663"/>
+          </a:xfrm>
+          <a:prstGeom prst="rect">
+            <a:avLst/>
+          </a:prstGeom>
+          <a:noFill/>
+        </p:spPr>
+        <p:txBody>
+          <a:bodyPr wrap="none" rtlCol="0">
+            <a:spAutoFit/>
+          </a:bodyPr>
+          <a:lstStyle/>
+          <a:p>
+            <a:r>
+              <a:rPr lang="en-US" sz="6000" b="1" dirty="0" smtClean="0">
+                <a:solidFill>
+                  <a:srgbClr val="0070C0"/>
+                </a:solidFill>
+                <a:latin typeface="Arial" panose="020B0604020202020204" pitchFamily="34" charset="0"/>
+                <a:cs typeface="Arial" panose="020B0604020202020204" pitchFamily="34" charset="0"/>
+              </a:rPr>
+              <a:t>Link Manager for</a:t>
+            </a:r>
+            <a:endParaRPr lang="en-GB" sz="6000" b="1" dirty="0">
+              <a:solidFill>
+                <a:srgbClr val="0070C0"/>
+              </a:solidFill>
+              <a:latin typeface="Arial" panose="020B0604020202020204" pitchFamily="34" charset="0"/>
+              <a:cs typeface="Arial" panose="020B0604020202020204" pitchFamily="34" charset="0"/>
+            </a:endParaRPr>
+          </a:p>
+        </p:txBody>
+      </p:sp>
+      <p:sp>
+        <p:nvSpPr>
+          <p:cNvPr id="11" name="TextBox 10"/>
+          <p:cNvSpPr txBox="1"/>
+          <p:nvPr/>
+        </p:nvSpPr>
+        <p:spPr>
+          <a:xfrm>
+            <a:off x="387824" y="2610791"/>
+            <a:ext cx="8449814" cy="2308324"/>
+          </a:xfrm>
+          <a:prstGeom prst="rect">
+            <a:avLst/>
+          </a:prstGeom>
+          <a:noFill/>
+        </p:spPr>
+        <p:txBody>
+          <a:bodyPr wrap="none" rtlCol="0">
+            <a:spAutoFit/>
+          </a:bodyPr>
+          <a:lstStyle/>
+          <a:p>
+            <a:r>
+              <a:rPr lang="en-US" sz="4800" dirty="0" smtClean="0">
+                <a:solidFill>
+                  <a:schemeClr val="tx1">
+                    <a:lumMod val="75000"/>
+                    <a:lumOff val="25000"/>
+                  </a:schemeClr>
+                </a:solidFill>
+              </a:rPr>
+              <a:t>Share direct download links</a:t>
+            </a:r>
+          </a:p>
+          <a:p>
+            <a:r>
+              <a:rPr lang="en-US" sz="4800" dirty="0" smtClean="0">
+                <a:solidFill>
+                  <a:schemeClr val="tx1">
+                    <a:lumMod val="75000"/>
+                    <a:lumOff val="25000"/>
+                  </a:schemeClr>
+                </a:solidFill>
+              </a:rPr>
+              <a:t>Share export-and-download links</a:t>
+            </a:r>
+          </a:p>
+          <a:p>
+            <a:r>
+              <a:rPr lang="en-US" sz="4800" dirty="0">
+                <a:solidFill>
+                  <a:schemeClr val="tx1">
+                    <a:lumMod val="75000"/>
+                    <a:lumOff val="25000"/>
+                  </a:schemeClr>
+                </a:solidFill>
+              </a:rPr>
+              <a:t> </a:t>
+            </a:r>
+            <a:r>
+              <a:rPr lang="en-US" sz="4800" dirty="0" smtClean="0">
+                <a:solidFill>
+                  <a:schemeClr val="tx1">
+                    <a:lumMod val="75000"/>
+                    <a:lumOff val="25000"/>
+                  </a:schemeClr>
+                </a:solidFill>
+              </a:rPr>
+              <a:t>  for native Google documents</a:t>
+            </a:r>
+            <a:endParaRPr lang="en-GB" sz="4800" dirty="0">
+              <a:solidFill>
+                <a:schemeClr val="tx1">
+                  <a:lumMod val="75000"/>
+                  <a:lumOff val="25000"/>
+                </a:schemeClr>
+              </a:solidFill>
+            </a:endParaRPr>
+          </a:p>
+        </p:txBody>
+      </p:sp>
+      <p:pic>
+        <p:nvPicPr>
+          <p:cNvPr id="2" name="Picture 1"/>
+          <p:cNvPicPr>
+            <a:picLocks noChangeAspect="1"/>
+          </p:cNvPicPr>
+          <p:nvPr/>
+        </p:nvPicPr>
+        <p:blipFill>
+          <a:blip r:embed="rId5" cstate="print">
+            <a:extLst>
+              <a:ext uri="{28A0092B-C50C-407E-A947-70E740481C1C}">
+                <a14:useLocalDpi xmlns:a14="http://schemas.microsoft.com/office/drawing/2010/main" val="0"/>
+              </a:ext>
+            </a:extLst>
+          </a:blip>
+          <a:stretch>
+            <a:fillRect/>
+          </a:stretch>
+        </p:blipFill>
+        <p:spPr>
+          <a:xfrm>
+            <a:off x="387824" y="368490"/>
+            <a:ext cx="1823113" cy="1823113"/>
+          </a:xfrm>
+          <a:prstGeom prst="rect">
+            <a:avLst/>
+          </a:prstGeom>
+        </p:spPr>
+      </p:pic>
+    </p:spTree>
+    <p:extLst>
+      <p:ext uri="{BB962C8B-B14F-4D97-AF65-F5344CB8AC3E}">
+        <p14:creationId xmlns:p14="http://schemas.microsoft.com/office/powerpoint/2010/main" val="433459749"/>
+      </p:ext>
+    </p:extLst>
+  </p:cSld>
+  <p:clrMapOvr>
+    <a:masterClrMapping/>
+  </p:clrMapOvr>
+  <p:timing>
+    <p:tnLst>
+      <p:par>
+        <p:cTn id="1" dur="indefinite" restart="never" nodeType="tmRoot"/>
+      </p:par>
+    </p:tnLst>
+  </p:timing>
+</p:sld>
+</file>
+
+<file path=ppt/slides/slide3.xml><?xml version="1.0" encoding="utf-8"?>
+<p:sld xmlns:a="http://schemas.openxmlformats.org/drawingml/2006/main" xmlns:r="http://schemas.openxmlformats.org/officeDocument/2006/relationships" xmlns:p="http://schemas.openxmlformats.org/presentationml/2006/main">
+  <p:cSld>
+    <p:spTree>
+      <p:nvGrpSpPr>
+        <p:cNvPr id="1" name=""/>
+        <p:cNvGrpSpPr/>
+        <p:nvPr/>
+      </p:nvGrpSpPr>
+      <p:grpSpPr>
+        <a:xfrm>
+          <a:off x="0" y="0"/>
+          <a:ext cx="0" cy="0"/>
+          <a:chOff x="0" y="0"/>
+          <a:chExt cx="0" cy="0"/>
+        </a:xfrm>
+      </p:grpSpPr>
+      <p:pic>
+        <p:nvPicPr>
+          <p:cNvPr id="5" name="Picture 4"/>
+          <p:cNvPicPr>
+            <a:picLocks noChangeAspect="1"/>
+          </p:cNvPicPr>
+          <p:nvPr/>
+        </p:nvPicPr>
+        <p:blipFill>
+          <a:blip r:embed="rId3">
+            <a:extLst>
+              <a:ext uri="{28A0092B-C50C-407E-A947-70E740481C1C}">
+                <a14:useLocalDpi xmlns:a14="http://schemas.microsoft.com/office/drawing/2010/main" val="0"/>
+              </a:ext>
+            </a:extLst>
+          </a:blip>
+          <a:stretch>
+            <a:fillRect/>
+          </a:stretch>
+        </p:blipFill>
+        <p:spPr>
+          <a:xfrm>
             <a:off x="7609628" y="4541010"/>
             <a:ext cx="4508120" cy="1502707"/>
           </a:xfrm>
@@ -3836,29 +4330,7 @@
                   </a:schemeClr>
                 </a:solidFill>
               </a:rPr>
-              <a:t>Share </a:t>
-            </a:r>
-            <a:r>
-              <a:rPr lang="en-US" sz="5400" dirty="0" smtClean="0">
-                <a:solidFill>
-                  <a:schemeClr val="tx1">
-                    <a:lumMod val="75000"/>
-                    <a:lumOff val="25000"/>
-                  </a:schemeClr>
-                </a:solidFill>
-              </a:rPr>
-              <a:t>export-and-download </a:t>
-            </a:r>
-            <a:r>
-              <a:rPr lang="en-US" sz="5400" dirty="0" smtClean="0">
-                <a:solidFill>
-                  <a:schemeClr val="tx1">
-                    <a:lumMod val="75000"/>
-                    <a:lumOff val="25000"/>
-                  </a:schemeClr>
-                </a:solidFill>
-              </a:rPr>
-              <a:t>links</a:t>
+              <a:t>Share export-and-download links</a:t>
             </a:r>
           </a:p>
           <a:p>
@@ -3945,7 +4417,7 @@
 </p:sld>
 </file>
 
-<file path=ppt/slides/slide3.xml><?xml version="1.0" encoding="utf-8"?>
+<file path=ppt/slides/slide4.xml><?xml version="1.0" encoding="utf-8"?>
 <p:sld xmlns:a="http://schemas.openxmlformats.org/drawingml/2006/main" xmlns:r="http://schemas.openxmlformats.org/officeDocument/2006/relationships" xmlns:p="http://schemas.openxmlformats.org/presentationml/2006/main">
   <p:cSld>
     <p:spTree>
@@ -4413,7 +4885,7 @@
 </p:sld>
 </file>
 
-<file path=ppt/slides/slide4.xml><?xml version="1.0" encoding="utf-8"?>
+<file path=ppt/slides/slide5.xml><?xml version="1.0" encoding="utf-8"?>
 <p:sld xmlns:a="http://schemas.openxmlformats.org/drawingml/2006/main" xmlns:r="http://schemas.openxmlformats.org/officeDocument/2006/relationships" xmlns:p="http://schemas.openxmlformats.org/presentationml/2006/main">
   <p:cSld>
     <p:bg>
@@ -4886,6 +5358,624 @@
     <p:extLst>
       <p:ext uri="{BB962C8B-B14F-4D97-AF65-F5344CB8AC3E}">
         <p14:creationId xmlns:p14="http://schemas.microsoft.com/office/powerpoint/2010/main" val="1258825896"/>
+      </p:ext>
+    </p:extLst>
+  </p:cSld>
+  <p:clrMapOvr>
+    <a:masterClrMapping/>
+  </p:clrMapOvr>
+  <p:timing>
+    <p:tnLst>
+      <p:par>
+        <p:cTn id="1" dur="indefinite" restart="never" nodeType="tmRoot"/>
+      </p:par>
+    </p:tnLst>
+  </p:timing>
+</p:sld>
+</file>
+
+<file path=ppt/slides/slide6.xml><?xml version="1.0" encoding="utf-8"?>
+<p:sld xmlns:a="http://schemas.openxmlformats.org/drawingml/2006/main" xmlns:r="http://schemas.openxmlformats.org/officeDocument/2006/relationships" xmlns:p="http://schemas.openxmlformats.org/presentationml/2006/main">
+  <p:cSld>
+    <p:spTree>
+      <p:nvGrpSpPr>
+        <p:cNvPr id="1" name=""/>
+        <p:cNvGrpSpPr/>
+        <p:nvPr/>
+      </p:nvGrpSpPr>
+      <p:grpSpPr>
+        <a:xfrm>
+          <a:off x="0" y="0"/>
+          <a:ext cx="0" cy="0"/>
+          <a:chOff x="0" y="0"/>
+          <a:chExt cx="0" cy="0"/>
+        </a:xfrm>
+      </p:grpSpPr>
+      <p:sp>
+        <p:nvSpPr>
+          <p:cNvPr id="2" name="TextBox 1"/>
+          <p:cNvSpPr txBox="1"/>
+          <p:nvPr/>
+        </p:nvSpPr>
+        <p:spPr>
+          <a:xfrm>
+            <a:off x="300250" y="218364"/>
+            <a:ext cx="9480737" cy="2831544"/>
+          </a:xfrm>
+          <a:prstGeom prst="rect">
+            <a:avLst/>
+          </a:prstGeom>
+          <a:noFill/>
+        </p:spPr>
+        <p:txBody>
+          <a:bodyPr wrap="none" rtlCol="0">
+            <a:spAutoFit/>
+          </a:bodyPr>
+          <a:lstStyle/>
+          <a:p>
+            <a:r>
+              <a:rPr lang="en-US" sz="1600" dirty="0" smtClean="0"/>
+              <a:t>Change export </a:t>
+            </a:r>
+            <a:r>
+              <a:rPr lang="en-US" sz="1600" dirty="0" err="1" smtClean="0"/>
+              <a:t>png</a:t>
+            </a:r>
+            <a:r>
+              <a:rPr lang="en-US" sz="1600" dirty="0" smtClean="0"/>
+              <a:t> dimensions:</a:t>
+            </a:r>
+          </a:p>
+          <a:p>
+            <a:r>
+              <a:rPr lang="en-GB" sz="1600" dirty="0">
+                <a:hlinkClick r:id="rId2"/>
+              </a:rPr>
+              <a:t>https://</a:t>
+            </a:r>
+            <a:r>
+              <a:rPr lang="en-GB" sz="1600" dirty="0" smtClean="0">
+                <a:hlinkClick r:id="rId2"/>
+              </a:rPr>
+              <a:t>support.microsoft.com/en-us/help/827745/how-to-change-the-export-resolution-of-a-powerpoint-slide</a:t>
+            </a:r>
+            <a:endParaRPr lang="en-GB" sz="1600" dirty="0" smtClean="0"/>
+          </a:p>
+          <a:p>
+            <a:endParaRPr lang="en-US" sz="1600" dirty="0" smtClean="0"/>
+          </a:p>
+          <a:p>
+            <a:r>
+              <a:rPr lang="en-US" sz="1600" dirty="0" smtClean="0"/>
+              <a:t>Run  </a:t>
+            </a:r>
+            <a:r>
+              <a:rPr lang="en-US" sz="1600" dirty="0" err="1" smtClean="0"/>
+              <a:t>regedit</a:t>
+            </a:r>
+            <a:endParaRPr lang="en-US" sz="1600" dirty="0"/>
+          </a:p>
+          <a:p>
+            <a:endParaRPr lang="en-US" sz="1600" dirty="0"/>
+          </a:p>
+          <a:p>
+            <a:r>
+              <a:rPr lang="en-US" sz="1600" dirty="0" smtClean="0"/>
+              <a:t>Find a node:</a:t>
+            </a:r>
+          </a:p>
+          <a:p>
+            <a:r>
+              <a:rPr lang="en-US" sz="1600" dirty="0" smtClean="0"/>
+              <a:t>PP 2013 - </a:t>
+            </a:r>
+            <a:r>
+              <a:rPr lang="en-GB" sz="1600" dirty="0" smtClean="0"/>
+              <a:t>HKEY_CURRENT_USER\Software\Microsoft\Office\15.0\PowerPoint\Options</a:t>
+            </a:r>
+          </a:p>
+          <a:p>
+            <a:r>
+              <a:rPr lang="en-US" sz="1600" dirty="0" smtClean="0"/>
+              <a:t>PP 2016 - </a:t>
+            </a:r>
+            <a:r>
+              <a:rPr lang="en-GB" sz="1600" dirty="0" smtClean="0"/>
+              <a:t>HKEY_CURRENT_USER\Software\Microsoft\Office\16.0\PowerPoint\Options</a:t>
+            </a:r>
+          </a:p>
+          <a:p>
+            <a:endParaRPr lang="en-US" sz="1600" dirty="0" smtClean="0"/>
+          </a:p>
+          <a:p>
+            <a:r>
+              <a:rPr lang="en-US" sz="1600" dirty="0" smtClean="0"/>
+              <a:t>New &gt; DWORD Value = </a:t>
+            </a:r>
+            <a:r>
+              <a:rPr lang="en-GB" sz="1600" dirty="0" err="1" smtClean="0"/>
+              <a:t>ExportBitmapResolution</a:t>
+            </a:r>
+            <a:endParaRPr lang="en-GB" sz="1600" dirty="0" smtClean="0"/>
+          </a:p>
+          <a:p>
+            <a:r>
+              <a:rPr lang="en-US" sz="1600" dirty="0" smtClean="0"/>
+              <a:t>Modify &gt; Decimal &gt; Type value (dpi resolution)</a:t>
+            </a:r>
+          </a:p>
+        </p:txBody>
+      </p:sp>
+      <p:graphicFrame>
+        <p:nvGraphicFramePr>
+          <p:cNvPr id="3" name="Table 2"/>
+          <p:cNvGraphicFramePr>
+            <a:graphicFrameLocks noGrp="1"/>
+          </p:cNvGraphicFramePr>
+          <p:nvPr>
+            <p:extLst>
+              <p:ext uri="{D42A27DB-BD31-4B8C-83A1-F6EECF244321}">
+                <p14:modId xmlns:p14="http://schemas.microsoft.com/office/powerpoint/2010/main" val="3691991366"/>
+              </p:ext>
+            </p:extLst>
+          </p:nvPr>
+        </p:nvGraphicFramePr>
+        <p:xfrm>
+          <a:off x="1404203" y="3230854"/>
+          <a:ext cx="8128000" cy="3510280"/>
+        </p:xfrm>
+        <a:graphic>
+          <a:graphicData uri="http://schemas.openxmlformats.org/drawingml/2006/table">
+            <a:tbl>
+              <a:tblPr firstRow="1" bandRow="1">
+                <a:tableStyleId>{5C22544A-7EE6-4342-B048-85BDC9FD1C3A}</a:tableStyleId>
+              </a:tblPr>
+              <a:tblGrid>
+                <a:gridCol w="2032000"/>
+                <a:gridCol w="2032000"/>
+                <a:gridCol w="2032000"/>
+                <a:gridCol w="2032000"/>
+              </a:tblGrid>
+              <a:tr h="370840">
+                <a:tc>
+                  <a:txBody>
+                    <a:bodyPr/>
+                    <a:lstStyle/>
+                    <a:p>
+                      <a:r>
+                        <a:rPr lang="en-GB" dirty="0"/>
+                        <a:t>Decimal value</a:t>
+                      </a:r>
+                    </a:p>
+                  </a:txBody>
+                  <a:tcPr anchor="ctr"/>
+                </a:tc>
+                <a:tc>
+                  <a:txBody>
+                    <a:bodyPr/>
+                    <a:lstStyle/>
+                    <a:p>
+                      <a:r>
+                        <a:rPr lang="en-GB"/>
+                        <a:t>Full-screen pixels (horizontal × vertical)</a:t>
+                      </a:r>
+                    </a:p>
+                  </a:txBody>
+                  <a:tcPr anchor="ctr"/>
+                </a:tc>
+                <a:tc>
+                  <a:txBody>
+                    <a:bodyPr/>
+                    <a:lstStyle/>
+                    <a:p>
+                      <a:r>
+                        <a:rPr lang="en-GB"/>
+                        <a:t>Widescreen pixels (horizontal × vertical)</a:t>
+                      </a:r>
+                    </a:p>
+                  </a:txBody>
+                  <a:tcPr anchor="ctr"/>
+                </a:tc>
+                <a:tc>
+                  <a:txBody>
+                    <a:bodyPr/>
+                    <a:lstStyle/>
+                    <a:p>
+                      <a:r>
+                        <a:rPr lang="en-GB"/>
+                        <a:t>Dots per inch (horizontal and vertical)</a:t>
+                      </a:r>
+                    </a:p>
+                  </a:txBody>
+                  <a:tcPr anchor="ctr"/>
+                </a:tc>
+              </a:tr>
+              <a:tr h="370840">
+                <a:tc>
+                  <a:txBody>
+                    <a:bodyPr/>
+                    <a:lstStyle/>
+                    <a:p>
+                      <a:r>
+                        <a:rPr lang="en-GB"/>
+                        <a:t>50</a:t>
+                      </a:r>
+                    </a:p>
+                  </a:txBody>
+                  <a:tcPr anchor="ctr"/>
+                </a:tc>
+                <a:tc>
+                  <a:txBody>
+                    <a:bodyPr/>
+                    <a:lstStyle/>
+                    <a:p>
+                      <a:r>
+                        <a:rPr lang="en-GB"/>
+                        <a:t>500 × 375</a:t>
+                      </a:r>
+                    </a:p>
+                  </a:txBody>
+                  <a:tcPr anchor="ctr"/>
+                </a:tc>
+                <a:tc>
+                  <a:txBody>
+                    <a:bodyPr/>
+                    <a:lstStyle/>
+                    <a:p>
+                      <a:r>
+                        <a:rPr lang="en-GB"/>
+                        <a:t>667 × 375</a:t>
+                      </a:r>
+                    </a:p>
+                  </a:txBody>
+                  <a:tcPr anchor="ctr"/>
+                </a:tc>
+                <a:tc>
+                  <a:txBody>
+                    <a:bodyPr/>
+                    <a:lstStyle/>
+                    <a:p>
+                      <a:r>
+                        <a:rPr lang="en-GB"/>
+                        <a:t>50 dpi</a:t>
+                      </a:r>
+                    </a:p>
+                  </a:txBody>
+                  <a:tcPr anchor="ctr"/>
+                </a:tc>
+              </a:tr>
+              <a:tr h="370840">
+                <a:tc>
+                  <a:txBody>
+                    <a:bodyPr/>
+                    <a:lstStyle/>
+                    <a:p>
+                      <a:r>
+                        <a:rPr lang="en-GB"/>
+                        <a:t>96 (default)</a:t>
+                      </a:r>
+                    </a:p>
+                  </a:txBody>
+                  <a:tcPr anchor="ctr"/>
+                </a:tc>
+                <a:tc>
+                  <a:txBody>
+                    <a:bodyPr/>
+                    <a:lstStyle/>
+                    <a:p>
+                      <a:r>
+                        <a:rPr lang="en-GB"/>
+                        <a:t>960 × 720</a:t>
+                      </a:r>
+                    </a:p>
+                  </a:txBody>
+                  <a:tcPr anchor="ctr"/>
+                </a:tc>
+                <a:tc>
+                  <a:txBody>
+                    <a:bodyPr/>
+                    <a:lstStyle/>
+                    <a:p>
+                      <a:r>
+                        <a:rPr lang="en-GB"/>
+                        <a:t>1280 × 720</a:t>
+                      </a:r>
+                    </a:p>
+                  </a:txBody>
+                  <a:tcPr anchor="ctr"/>
+                </a:tc>
+                <a:tc>
+                  <a:txBody>
+                    <a:bodyPr/>
+                    <a:lstStyle/>
+                    <a:p>
+                      <a:r>
+                        <a:rPr lang="en-GB"/>
+                        <a:t>96 dpi</a:t>
+                      </a:r>
+                    </a:p>
+                  </a:txBody>
+                  <a:tcPr anchor="ctr"/>
+                </a:tc>
+              </a:tr>
+              <a:tr h="370840">
+                <a:tc>
+                  <a:txBody>
+                    <a:bodyPr/>
+                    <a:lstStyle/>
+                    <a:p>
+                      <a:r>
+                        <a:rPr lang="en-GB"/>
+                        <a:t>100</a:t>
+                      </a:r>
+                    </a:p>
+                  </a:txBody>
+                  <a:tcPr anchor="ctr"/>
+                </a:tc>
+                <a:tc>
+                  <a:txBody>
+                    <a:bodyPr/>
+                    <a:lstStyle/>
+                    <a:p>
+                      <a:r>
+                        <a:rPr lang="en-GB"/>
+                        <a:t>1000 × 750</a:t>
+                      </a:r>
+                    </a:p>
+                  </a:txBody>
+                  <a:tcPr anchor="ctr"/>
+                </a:tc>
+                <a:tc>
+                  <a:txBody>
+                    <a:bodyPr/>
+                    <a:lstStyle/>
+                    <a:p>
+                      <a:r>
+                        <a:rPr lang="en-GB"/>
+                        <a:t>1333 × 750</a:t>
+                      </a:r>
+                    </a:p>
+                  </a:txBody>
+                  <a:tcPr anchor="ctr"/>
+                </a:tc>
+                <a:tc>
+                  <a:txBody>
+                    <a:bodyPr/>
+                    <a:lstStyle/>
+                    <a:p>
+                      <a:r>
+                        <a:rPr lang="en-GB"/>
+                        <a:t>100 dpi</a:t>
+                      </a:r>
+                    </a:p>
+                  </a:txBody>
+                  <a:tcPr anchor="ctr"/>
+                </a:tc>
+              </a:tr>
+              <a:tr h="370840">
+                <a:tc>
+                  <a:txBody>
+                    <a:bodyPr/>
+                    <a:lstStyle/>
+                    <a:p>
+                      <a:r>
+                        <a:rPr lang="en-GB"/>
+                        <a:t>150</a:t>
+                      </a:r>
+                    </a:p>
+                  </a:txBody>
+                  <a:tcPr anchor="ctr"/>
+                </a:tc>
+                <a:tc>
+                  <a:txBody>
+                    <a:bodyPr/>
+                    <a:lstStyle/>
+                    <a:p>
+                      <a:r>
+                        <a:rPr lang="en-GB"/>
+                        <a:t>1500 × 1125</a:t>
+                      </a:r>
+                    </a:p>
+                  </a:txBody>
+                  <a:tcPr anchor="ctr"/>
+                </a:tc>
+                <a:tc>
+                  <a:txBody>
+                    <a:bodyPr/>
+                    <a:lstStyle/>
+                    <a:p>
+                      <a:r>
+                        <a:rPr lang="en-GB"/>
+                        <a:t>2000 × 1125</a:t>
+                      </a:r>
+                    </a:p>
+                  </a:txBody>
+                  <a:tcPr anchor="ctr"/>
+                </a:tc>
+                <a:tc>
+                  <a:txBody>
+                    <a:bodyPr/>
+                    <a:lstStyle/>
+                    <a:p>
+                      <a:r>
+                        <a:rPr lang="en-GB"/>
+                        <a:t>150 dpi</a:t>
+                      </a:r>
+                    </a:p>
+                  </a:txBody>
+                  <a:tcPr anchor="ctr"/>
+                </a:tc>
+              </a:tr>
+              <a:tr h="370840">
+                <a:tc>
+                  <a:txBody>
+                    <a:bodyPr/>
+                    <a:lstStyle/>
+                    <a:p>
+                      <a:r>
+                        <a:rPr lang="en-GB"/>
+                        <a:t>200</a:t>
+                      </a:r>
+                    </a:p>
+                  </a:txBody>
+                  <a:tcPr anchor="ctr"/>
+                </a:tc>
+                <a:tc>
+                  <a:txBody>
+                    <a:bodyPr/>
+                    <a:lstStyle/>
+                    <a:p>
+                      <a:r>
+                        <a:rPr lang="en-GB"/>
+                        <a:t>2000 × 1500</a:t>
+                      </a:r>
+                    </a:p>
+                  </a:txBody>
+                  <a:tcPr anchor="ctr"/>
+                </a:tc>
+                <a:tc>
+                  <a:txBody>
+                    <a:bodyPr/>
+                    <a:lstStyle/>
+                    <a:p>
+                      <a:r>
+                        <a:rPr lang="en-GB"/>
+                        <a:t>2667 × 1500</a:t>
+                      </a:r>
+                    </a:p>
+                  </a:txBody>
+                  <a:tcPr anchor="ctr"/>
+                </a:tc>
+                <a:tc>
+                  <a:txBody>
+                    <a:bodyPr/>
+                    <a:lstStyle/>
+                    <a:p>
+                      <a:r>
+                        <a:rPr lang="en-GB"/>
+                        <a:t>200 dpi</a:t>
+                      </a:r>
+                    </a:p>
+                  </a:txBody>
+                  <a:tcPr anchor="ctr"/>
+                </a:tc>
+              </a:tr>
+              <a:tr h="370840">
+                <a:tc>
+                  <a:txBody>
+                    <a:bodyPr/>
+                    <a:lstStyle/>
+                    <a:p>
+                      <a:r>
+                        <a:rPr lang="en-GB"/>
+                        <a:t>250</a:t>
+                      </a:r>
+                    </a:p>
+                  </a:txBody>
+                  <a:tcPr anchor="ctr"/>
+                </a:tc>
+                <a:tc>
+                  <a:txBody>
+                    <a:bodyPr/>
+                    <a:lstStyle/>
+                    <a:p>
+                      <a:r>
+                        <a:rPr lang="en-GB"/>
+                        <a:t>2500 × 1875</a:t>
+                      </a:r>
+                    </a:p>
+                  </a:txBody>
+                  <a:tcPr anchor="ctr"/>
+                </a:tc>
+                <a:tc>
+                  <a:txBody>
+                    <a:bodyPr/>
+                    <a:lstStyle/>
+                    <a:p>
+                      <a:r>
+                        <a:rPr lang="en-GB"/>
+                        <a:t>3333 × 1875</a:t>
+                      </a:r>
+                    </a:p>
+                  </a:txBody>
+                  <a:tcPr anchor="ctr"/>
+                </a:tc>
+                <a:tc>
+                  <a:txBody>
+                    <a:bodyPr/>
+                    <a:lstStyle/>
+                    <a:p>
+                      <a:r>
+                        <a:rPr lang="en-GB"/>
+                        <a:t>250 dpi</a:t>
+                      </a:r>
+                    </a:p>
+                  </a:txBody>
+                  <a:tcPr anchor="ctr"/>
+                </a:tc>
+              </a:tr>
+              <a:tr h="370840">
+                <a:tc>
+                  <a:txBody>
+                    <a:bodyPr/>
+                    <a:lstStyle/>
+                    <a:p>
+                      <a:r>
+                        <a:rPr lang="en-GB"/>
+                        <a:t>300</a:t>
+                      </a:r>
+                    </a:p>
+                  </a:txBody>
+                  <a:tcPr anchor="ctr"/>
+                </a:tc>
+                <a:tc>
+                  <a:txBody>
+                    <a:bodyPr/>
+                    <a:lstStyle/>
+                    <a:p>
+                      <a:r>
+                        <a:rPr lang="en-GB"/>
+                        <a:t>3000 × 2250</a:t>
+                      </a:r>
+                    </a:p>
+                  </a:txBody>
+                  <a:tcPr anchor="ctr"/>
+                </a:tc>
+                <a:tc>
+                  <a:txBody>
+                    <a:bodyPr/>
+                    <a:lstStyle/>
+                    <a:p>
+                      <a:r>
+                        <a:rPr lang="en-GB"/>
+                        <a:t>4000 × 2250</a:t>
+                      </a:r>
+                    </a:p>
+                  </a:txBody>
+                  <a:tcPr anchor="ctr"/>
+                </a:tc>
+                <a:tc>
+                  <a:txBody>
+                    <a:bodyPr/>
+                    <a:lstStyle/>
+                    <a:p>
+                      <a:r>
+                        <a:rPr lang="en-GB" dirty="0"/>
+                        <a:t>300 dpi</a:t>
+                      </a:r>
+                    </a:p>
+                  </a:txBody>
+                  <a:tcPr anchor="ctr"/>
+                </a:tc>
+              </a:tr>
+            </a:tbl>
+          </a:graphicData>
+        </a:graphic>
+      </p:graphicFrame>
+    </p:spTree>
+    <p:extLst>
+      <p:ext uri="{BB962C8B-B14F-4D97-AF65-F5344CB8AC3E}">
+        <p14:creationId xmlns:p14="http://schemas.microsoft.com/office/powerpoint/2010/main" val="172603368"/>
       </p:ext>
     </p:extLst>
   </p:cSld>

</xml_diff>

<commit_message>
add cws marquee 1400x560
</commit_message>
<xml_diff>
--- a/dist-env/src/cws/app-promo/promo.pptx
+++ b/dist-env/src/cws/app-promo/promo.pptx
@@ -5,15 +5,16 @@
     <p:sldMasterId id="2147483648" r:id="rId1"/>
   </p:sldMasterIdLst>
   <p:notesMasterIdLst>
-    <p:notesMasterId r:id="rId8"/>
+    <p:notesMasterId r:id="rId9"/>
   </p:notesMasterIdLst>
   <p:sldIdLst>
     <p:sldId id="256" r:id="rId2"/>
     <p:sldId id="261" r:id="rId3"/>
-    <p:sldId id="259" r:id="rId4"/>
-    <p:sldId id="257" r:id="rId5"/>
-    <p:sldId id="258" r:id="rId6"/>
-    <p:sldId id="260" r:id="rId7"/>
+    <p:sldId id="262" r:id="rId4"/>
+    <p:sldId id="259" r:id="rId5"/>
+    <p:sldId id="257" r:id="rId6"/>
+    <p:sldId id="258" r:id="rId7"/>
+    <p:sldId id="260" r:id="rId8"/>
   </p:sldIdLst>
   <p:sldSz cx="12192000" cy="6858000"/>
   <p:notesSz cx="6858000" cy="9144000"/>
@@ -692,7 +693,7 @@
           <a:p>
             <a:r>
               <a:rPr lang="en-US" dirty="0" smtClean="0"/>
-              <a:t>Facebook 1280x630</a:t>
+              <a:t>CWS Marquee 1400x560</a:t>
             </a:r>
             <a:endParaRPr lang="en-GB" dirty="0"/>
           </a:p>
@@ -724,7 +725,7 @@
     </p:spTree>
     <p:extLst>
       <p:ext uri="{BB962C8B-B14F-4D97-AF65-F5344CB8AC3E}">
-        <p14:creationId xmlns:p14="http://schemas.microsoft.com/office/powerpoint/2010/main" val="551983896"/>
+        <p14:creationId xmlns:p14="http://schemas.microsoft.com/office/powerpoint/2010/main" val="2220938316"/>
       </p:ext>
     </p:extLst>
   </p:cSld>
@@ -780,7 +781,7 @@
           <a:p>
             <a:r>
               <a:rPr lang="en-US" dirty="0" smtClean="0"/>
-              <a:t>icon</a:t>
+              <a:t>Facebook 1280x630</a:t>
             </a:r>
             <a:endParaRPr lang="en-GB" dirty="0"/>
           </a:p>
@@ -803,7 +804,95 @@
           <a:p>
             <a:fld id="{427AF63E-676C-490F-B031-3BAEFE8BE401}" type="slidenum">
               <a:rPr lang="en-GB" smtClean="0"/>
-              <a:t>5</a:t>
+              <a:t>4</a:t>
+            </a:fld>
+            <a:endParaRPr lang="en-GB"/>
+          </a:p>
+        </p:txBody>
+      </p:sp>
+    </p:spTree>
+    <p:extLst>
+      <p:ext uri="{BB962C8B-B14F-4D97-AF65-F5344CB8AC3E}">
+        <p14:creationId xmlns:p14="http://schemas.microsoft.com/office/powerpoint/2010/main" val="551983896"/>
+      </p:ext>
+    </p:extLst>
+  </p:cSld>
+  <p:clrMapOvr>
+    <a:masterClrMapping/>
+  </p:clrMapOvr>
+</p:notes>
+</file>
+
+<file path=ppt/notesSlides/notesSlide5.xml><?xml version="1.0" encoding="utf-8"?>
+<p:notes xmlns:a="http://schemas.openxmlformats.org/drawingml/2006/main" xmlns:r="http://schemas.openxmlformats.org/officeDocument/2006/relationships" xmlns:p="http://schemas.openxmlformats.org/presentationml/2006/main">
+  <p:cSld>
+    <p:spTree>
+      <p:nvGrpSpPr>
+        <p:cNvPr id="1" name=""/>
+        <p:cNvGrpSpPr/>
+        <p:nvPr/>
+      </p:nvGrpSpPr>
+      <p:grpSpPr>
+        <a:xfrm>
+          <a:off x="0" y="0"/>
+          <a:ext cx="0" cy="0"/>
+          <a:chOff x="0" y="0"/>
+          <a:chExt cx="0" cy="0"/>
+        </a:xfrm>
+      </p:grpSpPr>
+      <p:sp>
+        <p:nvSpPr>
+          <p:cNvPr id="2" name="Slide Image Placeholder 1"/>
+          <p:cNvSpPr>
+            <a:spLocks noGrp="1" noRot="1" noChangeAspect="1"/>
+          </p:cNvSpPr>
+          <p:nvPr>
+            <p:ph type="sldImg"/>
+          </p:nvPr>
+        </p:nvSpPr>
+        <p:spPr/>
+      </p:sp>
+      <p:sp>
+        <p:nvSpPr>
+          <p:cNvPr id="3" name="Notes Placeholder 2"/>
+          <p:cNvSpPr>
+            <a:spLocks noGrp="1"/>
+          </p:cNvSpPr>
+          <p:nvPr>
+            <p:ph type="body" idx="1"/>
+          </p:nvPr>
+        </p:nvSpPr>
+        <p:spPr/>
+        <p:txBody>
+          <a:bodyPr/>
+          <a:lstStyle/>
+          <a:p>
+            <a:r>
+              <a:rPr lang="en-US" dirty="0" smtClean="0"/>
+              <a:t>icon</a:t>
+            </a:r>
+            <a:endParaRPr lang="en-GB" dirty="0"/>
+          </a:p>
+        </p:txBody>
+      </p:sp>
+      <p:sp>
+        <p:nvSpPr>
+          <p:cNvPr id="4" name="Slide Number Placeholder 3"/>
+          <p:cNvSpPr>
+            <a:spLocks noGrp="1"/>
+          </p:cNvSpPr>
+          <p:nvPr>
+            <p:ph type="sldNum" sz="quarter" idx="10"/>
+          </p:nvPr>
+        </p:nvSpPr>
+        <p:spPr/>
+        <p:txBody>
+          <a:bodyPr/>
+          <a:lstStyle/>
+          <a:p>
+            <a:fld id="{427AF63E-676C-490F-B031-3BAEFE8BE401}" type="slidenum">
+              <a:rPr lang="en-GB" smtClean="0"/>
+              <a:t>6</a:t>
             </a:fld>
             <a:endParaRPr lang="en-GB"/>
           </a:p>
@@ -4186,6 +4275,254 @@
       </p:grpSpPr>
       <p:pic>
         <p:nvPicPr>
+          <p:cNvPr id="9" name="Picture 8"/>
+          <p:cNvPicPr>
+            <a:picLocks noChangeAspect="1"/>
+          </p:cNvPicPr>
+          <p:nvPr/>
+        </p:nvPicPr>
+        <p:blipFill>
+          <a:blip r:embed="rId3">
+            <a:extLst>
+              <a:ext uri="{28A0092B-C50C-407E-A947-70E740481C1C}">
+                <a14:useLocalDpi xmlns:a14="http://schemas.microsoft.com/office/drawing/2010/main" val="0"/>
+              </a:ext>
+            </a:extLst>
+          </a:blip>
+          <a:stretch>
+            <a:fillRect/>
+          </a:stretch>
+        </p:blipFill>
+        <p:spPr>
+          <a:xfrm>
+            <a:off x="2638955" y="1536252"/>
+            <a:ext cx="3196832" cy="655351"/>
+          </a:xfrm>
+          <a:prstGeom prst="rect">
+            <a:avLst/>
+          </a:prstGeom>
+        </p:spPr>
+      </p:pic>
+      <p:sp>
+        <p:nvSpPr>
+          <p:cNvPr id="10" name="TextBox 9"/>
+          <p:cNvSpPr txBox="1"/>
+          <p:nvPr/>
+        </p:nvSpPr>
+        <p:spPr>
+          <a:xfrm>
+            <a:off x="2500874" y="218662"/>
+            <a:ext cx="6381875" cy="1015663"/>
+          </a:xfrm>
+          <a:prstGeom prst="rect">
+            <a:avLst/>
+          </a:prstGeom>
+          <a:noFill/>
+        </p:spPr>
+        <p:txBody>
+          <a:bodyPr wrap="none" rtlCol="0">
+            <a:spAutoFit/>
+          </a:bodyPr>
+          <a:lstStyle/>
+          <a:p>
+            <a:r>
+              <a:rPr lang="en-US" sz="6000" b="1" dirty="0" smtClean="0">
+                <a:solidFill>
+                  <a:srgbClr val="0070C0"/>
+                </a:solidFill>
+                <a:latin typeface="Arial" panose="020B0604020202020204" pitchFamily="34" charset="0"/>
+                <a:cs typeface="Arial" panose="020B0604020202020204" pitchFamily="34" charset="0"/>
+              </a:rPr>
+              <a:t>Link Manager for</a:t>
+            </a:r>
+            <a:endParaRPr lang="en-GB" sz="6000" b="1" dirty="0">
+              <a:solidFill>
+                <a:srgbClr val="0070C0"/>
+              </a:solidFill>
+              <a:latin typeface="Arial" panose="020B0604020202020204" pitchFamily="34" charset="0"/>
+              <a:cs typeface="Arial" panose="020B0604020202020204" pitchFamily="34" charset="0"/>
+            </a:endParaRPr>
+          </a:p>
+        </p:txBody>
+      </p:sp>
+      <p:sp>
+        <p:nvSpPr>
+          <p:cNvPr id="11" name="TextBox 10"/>
+          <p:cNvSpPr txBox="1"/>
+          <p:nvPr/>
+        </p:nvSpPr>
+        <p:spPr>
+          <a:xfrm>
+            <a:off x="387824" y="2406071"/>
+            <a:ext cx="8449814" cy="954107"/>
+          </a:xfrm>
+          <a:prstGeom prst="rect">
+            <a:avLst/>
+          </a:prstGeom>
+          <a:noFill/>
+        </p:spPr>
+        <p:txBody>
+          <a:bodyPr wrap="square" rtlCol="0">
+            <a:spAutoFit/>
+          </a:bodyPr>
+          <a:lstStyle/>
+          <a:p>
+            <a:r>
+              <a:rPr lang="en-US" sz="2800" dirty="0" smtClean="0">
+                <a:solidFill>
+                  <a:schemeClr val="tx1">
+                    <a:lumMod val="75000"/>
+                    <a:lumOff val="25000"/>
+                  </a:schemeClr>
+                </a:solidFill>
+              </a:rPr>
+              <a:t>Share direct download </a:t>
+            </a:r>
+            <a:r>
+              <a:rPr lang="en-US" sz="2800" dirty="0" smtClean="0">
+                <a:solidFill>
+                  <a:schemeClr val="tx1">
+                    <a:lumMod val="75000"/>
+                    <a:lumOff val="25000"/>
+                  </a:schemeClr>
+                </a:solidFill>
+              </a:rPr>
+              <a:t>links.</a:t>
+            </a:r>
+            <a:endParaRPr lang="en-US" sz="2800" dirty="0" smtClean="0">
+              <a:solidFill>
+                <a:schemeClr val="tx1">
+                  <a:lumMod val="75000"/>
+                  <a:lumOff val="25000"/>
+                </a:schemeClr>
+              </a:solidFill>
+            </a:endParaRPr>
+          </a:p>
+          <a:p>
+            <a:r>
+              <a:rPr lang="en-US" sz="2800" dirty="0" smtClean="0">
+                <a:solidFill>
+                  <a:schemeClr val="tx1">
+                    <a:lumMod val="75000"/>
+                    <a:lumOff val="25000"/>
+                  </a:schemeClr>
+                </a:solidFill>
+              </a:rPr>
+              <a:t>Share export-and-download </a:t>
+            </a:r>
+            <a:r>
+              <a:rPr lang="en-US" sz="2800" dirty="0" smtClean="0">
+                <a:solidFill>
+                  <a:schemeClr val="tx1">
+                    <a:lumMod val="75000"/>
+                    <a:lumOff val="25000"/>
+                  </a:schemeClr>
+                </a:solidFill>
+              </a:rPr>
+              <a:t>links for </a:t>
+            </a:r>
+            <a:r>
+              <a:rPr lang="en-US" sz="2800" dirty="0" smtClean="0">
+                <a:solidFill>
+                  <a:schemeClr val="tx1">
+                    <a:lumMod val="75000"/>
+                    <a:lumOff val="25000"/>
+                  </a:schemeClr>
+                </a:solidFill>
+              </a:rPr>
+              <a:t>native Google </a:t>
+            </a:r>
+            <a:r>
+              <a:rPr lang="en-US" sz="2800" dirty="0" smtClean="0">
+                <a:solidFill>
+                  <a:schemeClr val="tx1">
+                    <a:lumMod val="75000"/>
+                    <a:lumOff val="25000"/>
+                  </a:schemeClr>
+                </a:solidFill>
+              </a:rPr>
+              <a:t>docs.</a:t>
+            </a:r>
+            <a:endParaRPr lang="en-GB" sz="2800" dirty="0">
+              <a:solidFill>
+                <a:schemeClr val="tx1">
+                  <a:lumMod val="75000"/>
+                  <a:lumOff val="25000"/>
+                </a:schemeClr>
+              </a:solidFill>
+            </a:endParaRPr>
+          </a:p>
+        </p:txBody>
+      </p:sp>
+      <p:pic>
+        <p:nvPicPr>
+          <p:cNvPr id="2" name="Picture 1"/>
+          <p:cNvPicPr>
+            <a:picLocks noChangeAspect="1"/>
+          </p:cNvPicPr>
+          <p:nvPr/>
+        </p:nvPicPr>
+        <p:blipFill>
+          <a:blip r:embed="rId4" cstate="print">
+            <a:extLst>
+              <a:ext uri="{28A0092B-C50C-407E-A947-70E740481C1C}">
+                <a14:useLocalDpi xmlns:a14="http://schemas.microsoft.com/office/drawing/2010/main" val="0"/>
+              </a:ext>
+            </a:extLst>
+          </a:blip>
+          <a:stretch>
+            <a:fillRect/>
+          </a:stretch>
+        </p:blipFill>
+        <p:spPr>
+          <a:xfrm>
+            <a:off x="387824" y="368490"/>
+            <a:ext cx="1823113" cy="1823113"/>
+          </a:xfrm>
+          <a:prstGeom prst="rect">
+            <a:avLst/>
+          </a:prstGeom>
+        </p:spPr>
+      </p:pic>
+    </p:spTree>
+    <p:extLst>
+      <p:ext uri="{BB962C8B-B14F-4D97-AF65-F5344CB8AC3E}">
+        <p14:creationId xmlns:p14="http://schemas.microsoft.com/office/powerpoint/2010/main" val="1243629398"/>
+      </p:ext>
+    </p:extLst>
+  </p:cSld>
+  <p:clrMapOvr>
+    <a:masterClrMapping/>
+  </p:clrMapOvr>
+  <p:timing>
+    <p:tnLst>
+      <p:par>
+        <p:cTn id="1" dur="indefinite" restart="never" nodeType="tmRoot"/>
+      </p:par>
+    </p:tnLst>
+  </p:timing>
+</p:sld>
+</file>
+
+<file path=ppt/slides/slide4.xml><?xml version="1.0" encoding="utf-8"?>
+<p:sld xmlns:a="http://schemas.openxmlformats.org/drawingml/2006/main" xmlns:r="http://schemas.openxmlformats.org/officeDocument/2006/relationships" xmlns:p="http://schemas.openxmlformats.org/presentationml/2006/main">
+  <p:cSld>
+    <p:spTree>
+      <p:nvGrpSpPr>
+        <p:cNvPr id="1" name=""/>
+        <p:cNvGrpSpPr/>
+        <p:nvPr/>
+      </p:nvGrpSpPr>
+      <p:grpSpPr>
+        <a:xfrm>
+          <a:off x="0" y="0"/>
+          <a:ext cx="0" cy="0"/>
+          <a:chOff x="0" y="0"/>
+          <a:chExt cx="0" cy="0"/>
+        </a:xfrm>
+      </p:grpSpPr>
+      <p:pic>
+        <p:nvPicPr>
           <p:cNvPr id="5" name="Picture 4"/>
           <p:cNvPicPr>
             <a:picLocks noChangeAspect="1"/>
@@ -4417,7 +4754,7 @@
 </p:sld>
 </file>
 
-<file path=ppt/slides/slide4.xml><?xml version="1.0" encoding="utf-8"?>
+<file path=ppt/slides/slide5.xml><?xml version="1.0" encoding="utf-8"?>
 <p:sld xmlns:a="http://schemas.openxmlformats.org/drawingml/2006/main" xmlns:r="http://schemas.openxmlformats.org/officeDocument/2006/relationships" xmlns:p="http://schemas.openxmlformats.org/presentationml/2006/main">
   <p:cSld>
     <p:spTree>
@@ -4885,7 +5222,7 @@
 </p:sld>
 </file>
 
-<file path=ppt/slides/slide5.xml><?xml version="1.0" encoding="utf-8"?>
+<file path=ppt/slides/slide6.xml><?xml version="1.0" encoding="utf-8"?>
 <p:sld xmlns:a="http://schemas.openxmlformats.org/drawingml/2006/main" xmlns:r="http://schemas.openxmlformats.org/officeDocument/2006/relationships" xmlns:p="http://schemas.openxmlformats.org/presentationml/2006/main">
   <p:cSld>
     <p:bg>
@@ -5374,7 +5711,7 @@
 </p:sld>
 </file>
 
-<file path=ppt/slides/slide6.xml><?xml version="1.0" encoding="utf-8"?>
+<file path=ppt/slides/slide7.xml><?xml version="1.0" encoding="utf-8"?>
 <p:sld xmlns:a="http://schemas.openxmlformats.org/drawingml/2006/main" xmlns:r="http://schemas.openxmlformats.org/officeDocument/2006/relationships" xmlns:p="http://schemas.openxmlformats.org/presentationml/2006/main">
   <p:cSld>
     <p:spTree>

</xml_diff>